<commit_message>
Update ITD_09_Interactions in Virtual Reality.pptx
</commit_message>
<xml_diff>
--- a/Modules/ITD/Week 7/ITD_09_Interactions in Virtual Reality.pptx
+++ b/Modules/ITD/Week 7/ITD_09_Interactions in Virtual Reality.pptx
@@ -5,42 +5,41 @@
     <p:sldMasterId id="2147483660" r:id="rId1"/>
   </p:sldMasterIdLst>
   <p:notesMasterIdLst>
-    <p:notesMasterId r:id="rId35"/>
+    <p:notesMasterId r:id="rId34"/>
   </p:notesMasterIdLst>
   <p:sldIdLst>
     <p:sldId id="256" r:id="rId2"/>
-    <p:sldId id="321" r:id="rId3"/>
-    <p:sldId id="324" r:id="rId4"/>
-    <p:sldId id="328" r:id="rId5"/>
-    <p:sldId id="325" r:id="rId6"/>
-    <p:sldId id="326" r:id="rId7"/>
-    <p:sldId id="327" r:id="rId8"/>
-    <p:sldId id="329" r:id="rId9"/>
-    <p:sldId id="330" r:id="rId10"/>
-    <p:sldId id="331" r:id="rId11"/>
-    <p:sldId id="332" r:id="rId12"/>
-    <p:sldId id="322" r:id="rId13"/>
-    <p:sldId id="333" r:id="rId14"/>
-    <p:sldId id="334" r:id="rId15"/>
-    <p:sldId id="335" r:id="rId16"/>
-    <p:sldId id="336" r:id="rId17"/>
-    <p:sldId id="337" r:id="rId18"/>
-    <p:sldId id="338" r:id="rId19"/>
-    <p:sldId id="339" r:id="rId20"/>
-    <p:sldId id="340" r:id="rId21"/>
-    <p:sldId id="341" r:id="rId22"/>
-    <p:sldId id="342" r:id="rId23"/>
-    <p:sldId id="343" r:id="rId24"/>
-    <p:sldId id="344" r:id="rId25"/>
-    <p:sldId id="345" r:id="rId26"/>
-    <p:sldId id="346" r:id="rId27"/>
-    <p:sldId id="347" r:id="rId28"/>
-    <p:sldId id="348" r:id="rId29"/>
-    <p:sldId id="350" r:id="rId30"/>
-    <p:sldId id="349" r:id="rId31"/>
-    <p:sldId id="351" r:id="rId32"/>
-    <p:sldId id="305" r:id="rId33"/>
-    <p:sldId id="323" r:id="rId34"/>
+    <p:sldId id="324" r:id="rId3"/>
+    <p:sldId id="328" r:id="rId4"/>
+    <p:sldId id="325" r:id="rId5"/>
+    <p:sldId id="326" r:id="rId6"/>
+    <p:sldId id="327" r:id="rId7"/>
+    <p:sldId id="329" r:id="rId8"/>
+    <p:sldId id="330" r:id="rId9"/>
+    <p:sldId id="331" r:id="rId10"/>
+    <p:sldId id="332" r:id="rId11"/>
+    <p:sldId id="322" r:id="rId12"/>
+    <p:sldId id="333" r:id="rId13"/>
+    <p:sldId id="334" r:id="rId14"/>
+    <p:sldId id="335" r:id="rId15"/>
+    <p:sldId id="336" r:id="rId16"/>
+    <p:sldId id="337" r:id="rId17"/>
+    <p:sldId id="338" r:id="rId18"/>
+    <p:sldId id="339" r:id="rId19"/>
+    <p:sldId id="340" r:id="rId20"/>
+    <p:sldId id="341" r:id="rId21"/>
+    <p:sldId id="342" r:id="rId22"/>
+    <p:sldId id="343" r:id="rId23"/>
+    <p:sldId id="344" r:id="rId24"/>
+    <p:sldId id="345" r:id="rId25"/>
+    <p:sldId id="346" r:id="rId26"/>
+    <p:sldId id="347" r:id="rId27"/>
+    <p:sldId id="348" r:id="rId28"/>
+    <p:sldId id="350" r:id="rId29"/>
+    <p:sldId id="349" r:id="rId30"/>
+    <p:sldId id="351" r:id="rId31"/>
+    <p:sldId id="305" r:id="rId32"/>
+    <p:sldId id="323" r:id="rId33"/>
   </p:sldIdLst>
   <p:sldSz cx="12192000" cy="6858000"/>
   <p:notesSz cx="6858000" cy="9144000"/>
@@ -229,7 +228,7 @@
           <a:p>
             <a:fld id="{1C633808-4D66-4A18-AEB5-16F5EA9B7D51}" type="datetimeFigureOut">
               <a:rPr lang="en-US" smtClean="0"/>
-              <a:t>11/30/2021</a:t>
+              <a:t>12/1/2021</a:t>
             </a:fld>
             <a:endParaRPr lang="en-US"/>
           </a:p>
@@ -643,7 +642,7 @@
           <a:p>
             <a:fld id="{6C36B2C3-558B-48FB-A029-22CFB7392BA1}" type="datetimeFigureOut">
               <a:rPr lang="en-US" smtClean="0"/>
-              <a:t>11/30/2021</a:t>
+              <a:t>12/1/2021</a:t>
             </a:fld>
             <a:endParaRPr lang="en-US"/>
           </a:p>
@@ -841,7 +840,7 @@
           <a:p>
             <a:fld id="{6C36B2C3-558B-48FB-A029-22CFB7392BA1}" type="datetimeFigureOut">
               <a:rPr lang="en-US" smtClean="0"/>
-              <a:t>11/30/2021</a:t>
+              <a:t>12/1/2021</a:t>
             </a:fld>
             <a:endParaRPr lang="en-US"/>
           </a:p>
@@ -1049,7 +1048,7 @@
           <a:p>
             <a:fld id="{6C36B2C3-558B-48FB-A029-22CFB7392BA1}" type="datetimeFigureOut">
               <a:rPr lang="en-US" smtClean="0"/>
-              <a:t>11/30/2021</a:t>
+              <a:t>12/1/2021</a:t>
             </a:fld>
             <a:endParaRPr lang="en-US"/>
           </a:p>
@@ -1247,7 +1246,7 @@
           <a:p>
             <a:fld id="{6C36B2C3-558B-48FB-A029-22CFB7392BA1}" type="datetimeFigureOut">
               <a:rPr lang="en-US" smtClean="0"/>
-              <a:t>11/30/2021</a:t>
+              <a:t>12/1/2021</a:t>
             </a:fld>
             <a:endParaRPr lang="en-US" dirty="0"/>
           </a:p>
@@ -1693,7 +1692,7 @@
           <a:p>
             <a:fld id="{6C36B2C3-558B-48FB-A029-22CFB7392BA1}" type="datetimeFigureOut">
               <a:rPr lang="en-US" smtClean="0"/>
-              <a:t>11/30/2021</a:t>
+              <a:t>12/1/2021</a:t>
             </a:fld>
             <a:endParaRPr lang="en-US"/>
           </a:p>
@@ -1958,7 +1957,7 @@
           <a:p>
             <a:fld id="{6C36B2C3-558B-48FB-A029-22CFB7392BA1}" type="datetimeFigureOut">
               <a:rPr lang="en-US" smtClean="0"/>
-              <a:t>11/30/2021</a:t>
+              <a:t>12/1/2021</a:t>
             </a:fld>
             <a:endParaRPr lang="en-US"/>
           </a:p>
@@ -2370,7 +2369,7 @@
           <a:p>
             <a:fld id="{6C36B2C3-558B-48FB-A029-22CFB7392BA1}" type="datetimeFigureOut">
               <a:rPr lang="en-US" smtClean="0"/>
-              <a:t>11/30/2021</a:t>
+              <a:t>12/1/2021</a:t>
             </a:fld>
             <a:endParaRPr lang="en-US"/>
           </a:p>
@@ -2511,7 +2510,7 @@
           <a:p>
             <a:fld id="{6C36B2C3-558B-48FB-A029-22CFB7392BA1}" type="datetimeFigureOut">
               <a:rPr lang="en-US" smtClean="0"/>
-              <a:t>11/30/2021</a:t>
+              <a:t>12/1/2021</a:t>
             </a:fld>
             <a:endParaRPr lang="en-US"/>
           </a:p>
@@ -2624,7 +2623,7 @@
           <a:p>
             <a:fld id="{6C36B2C3-558B-48FB-A029-22CFB7392BA1}" type="datetimeFigureOut">
               <a:rPr lang="en-US" smtClean="0"/>
-              <a:t>11/30/2021</a:t>
+              <a:t>12/1/2021</a:t>
             </a:fld>
             <a:endParaRPr lang="en-US"/>
           </a:p>
@@ -2935,7 +2934,7 @@
           <a:p>
             <a:fld id="{6C36B2C3-558B-48FB-A029-22CFB7392BA1}" type="datetimeFigureOut">
               <a:rPr lang="en-US" smtClean="0"/>
-              <a:t>11/30/2021</a:t>
+              <a:t>12/1/2021</a:t>
             </a:fld>
             <a:endParaRPr lang="en-US"/>
           </a:p>
@@ -3226,7 +3225,7 @@
           <a:p>
             <a:fld id="{6C36B2C3-558B-48FB-A029-22CFB7392BA1}" type="datetimeFigureOut">
               <a:rPr lang="en-US" smtClean="0"/>
-              <a:t>11/30/2021</a:t>
+              <a:t>12/1/2021</a:t>
             </a:fld>
             <a:endParaRPr lang="en-US"/>
           </a:p>
@@ -3467,7 +3466,7 @@
           <a:p>
             <a:fld id="{6C36B2C3-558B-48FB-A029-22CFB7392BA1}" type="datetimeFigureOut">
               <a:rPr lang="en-US" smtClean="0"/>
-              <a:t>11/30/2021</a:t>
+              <a:t>12/1/2021</a:t>
             </a:fld>
             <a:endParaRPr lang="en-US"/>
           </a:p>
@@ -4207,36 +4206,6 @@
           <a:chExt cx="0" cy="0"/>
         </a:xfrm>
       </p:grpSpPr>
-      <p:pic>
-        <p:nvPicPr>
-          <p:cNvPr id="5" name="Picture 4">
-            <a:extLst>
-              <a:ext uri="{FF2B5EF4-FFF2-40B4-BE49-F238E27FC236}">
-                <a16:creationId xmlns:a16="http://schemas.microsoft.com/office/drawing/2014/main" id="{304AD8DB-35D2-4B4C-896D-4BB91A5CC073}"/>
-              </a:ext>
-            </a:extLst>
-          </p:cNvPr>
-          <p:cNvPicPr>
-            <a:picLocks noChangeAspect="1"/>
-          </p:cNvPicPr>
-          <p:nvPr/>
-        </p:nvPicPr>
-        <p:blipFill>
-          <a:blip r:embed="rId2"/>
-          <a:stretch>
-            <a:fillRect/>
-          </a:stretch>
-        </p:blipFill>
-        <p:spPr>
-          <a:xfrm>
-            <a:off x="6843713" y="1543050"/>
-            <a:ext cx="5353050" cy="4610100"/>
-          </a:xfrm>
-          <a:prstGeom prst="rect">
-            <a:avLst/>
-          </a:prstGeom>
-        </p:spPr>
-      </p:pic>
       <p:sp>
         <p:nvSpPr>
           <p:cNvPr id="2" name="Title 1">
@@ -4288,7 +4257,7 @@
         <p:spPr>
           <a:xfrm>
             <a:off x="838200" y="1690688"/>
-            <a:ext cx="6010275" cy="4651923"/>
+            <a:ext cx="10515600" cy="4651923"/>
           </a:xfrm>
         </p:spPr>
         <p:txBody>
@@ -4301,7 +4270,16 @@
               <a:rPr lang="en-US" sz="2400" dirty="0">
                 <a:latin typeface="Bahnschrift" panose="020B0502040204020203" pitchFamily="34" charset="0"/>
               </a:rPr>
-              <a:t>Now select the new Direct Interactor object and look for the ‘XR Controller’ component there.</a:t>
+              <a:t>Once that is done, the old Controller with the Ray Interactor can be deleted.</a:t>
+            </a:r>
+          </a:p>
+          <a:p>
+            <a:pPr lvl="1"/>
+            <a:r>
+              <a:rPr lang="en-US" sz="2000" dirty="0">
+                <a:latin typeface="Bahnschrift" panose="020B0502040204020203" pitchFamily="34" charset="0"/>
+              </a:rPr>
+              <a:t>It would be a good idea to rename the new Controller object to something like ‘Right Controller’ to keep things organized.</a:t>
             </a:r>
           </a:p>
           <a:p>
@@ -4314,7 +4292,7 @@
               <a:rPr lang="en-US" sz="2400" dirty="0">
                 <a:latin typeface="Bahnschrift" panose="020B0502040204020203" pitchFamily="34" charset="0"/>
               </a:rPr>
-              <a:t>Click on the meatballs icon and select ‘Paste Component Values’.</a:t>
+              <a:t>If the design of your game requires both of your controllers to use Direct Interactors, repeat the above steps for the other controller as well.</a:t>
             </a:r>
           </a:p>
           <a:p>
@@ -4327,18 +4305,24 @@
               <a:rPr lang="en-US" sz="2400" dirty="0">
                 <a:latin typeface="Bahnschrift" panose="020B0502040204020203" pitchFamily="34" charset="0"/>
               </a:rPr>
-              <a:t>The values from last week’s Controller will now be pasted on our new object. </a:t>
-            </a:r>
-            <a:endParaRPr lang="en-US" sz="2000" dirty="0">
-              <a:latin typeface="Bahnschrift" panose="020B0502040204020203" pitchFamily="34" charset="0"/>
-            </a:endParaRPr>
+              <a:t>For this lesson, only one controller needs to be ‘converted’ to a Direct Interactor.</a:t>
+            </a:r>
+          </a:p>
+          <a:p>
+            <a:pPr lvl="1"/>
+            <a:r>
+              <a:rPr lang="en-US" sz="2000" dirty="0">
+                <a:latin typeface="Bahnschrift" panose="020B0502040204020203" pitchFamily="34" charset="0"/>
+              </a:rPr>
+              <a:t>We will use the Ray Interactor next week.</a:t>
+            </a:r>
           </a:p>
         </p:txBody>
       </p:sp>
     </p:spTree>
     <p:extLst>
       <p:ext uri="{BB962C8B-B14F-4D97-AF65-F5344CB8AC3E}">
-        <p14:creationId xmlns:p14="http://schemas.microsoft.com/office/powerpoint/2010/main" val="2528221400"/>
+        <p14:creationId xmlns:p14="http://schemas.microsoft.com/office/powerpoint/2010/main" val="1343221364"/>
       </p:ext>
     </p:extLst>
   </p:cSld>
@@ -4367,149 +4351,6 @@
       </p:grpSpPr>
       <p:sp>
         <p:nvSpPr>
-          <p:cNvPr id="2" name="Title 1">
-            <a:extLst>
-              <a:ext uri="{FF2B5EF4-FFF2-40B4-BE49-F238E27FC236}">
-                <a16:creationId xmlns:a16="http://schemas.microsoft.com/office/drawing/2014/main" id="{264E5970-3812-4B23-BF67-26CB2C14C1EB}"/>
-              </a:ext>
-            </a:extLst>
-          </p:cNvPr>
-          <p:cNvSpPr>
-            <a:spLocks noGrp="1"/>
-          </p:cNvSpPr>
-          <p:nvPr>
-            <p:ph type="title"/>
-          </p:nvPr>
-        </p:nvSpPr>
-        <p:spPr/>
-        <p:txBody>
-          <a:bodyPr>
-            <a:normAutofit/>
-          </a:bodyPr>
-          <a:lstStyle/>
-          <a:p>
-            <a:r>
-              <a:rPr lang="en-US" dirty="0">
-                <a:latin typeface="Bahnschrift" panose="020B0502040204020203" pitchFamily="34" charset="0"/>
-              </a:rPr>
-              <a:t>XR Direct Interactor</a:t>
-            </a:r>
-          </a:p>
-        </p:txBody>
-      </p:sp>
-      <p:sp>
-        <p:nvSpPr>
-          <p:cNvPr id="3" name="Content Placeholder 2">
-            <a:extLst>
-              <a:ext uri="{FF2B5EF4-FFF2-40B4-BE49-F238E27FC236}">
-                <a16:creationId xmlns:a16="http://schemas.microsoft.com/office/drawing/2014/main" id="{49FD8C2D-32F9-4E05-B1D6-A27CCD110BEC}"/>
-              </a:ext>
-            </a:extLst>
-          </p:cNvPr>
-          <p:cNvSpPr>
-            <a:spLocks noGrp="1"/>
-          </p:cNvSpPr>
-          <p:nvPr>
-            <p:ph idx="1"/>
-          </p:nvPr>
-        </p:nvSpPr>
-        <p:spPr>
-          <a:xfrm>
-            <a:off x="838200" y="1690688"/>
-            <a:ext cx="10515600" cy="4651923"/>
-          </a:xfrm>
-        </p:spPr>
-        <p:txBody>
-          <a:bodyPr>
-            <a:normAutofit/>
-          </a:bodyPr>
-          <a:lstStyle/>
-          <a:p>
-            <a:r>
-              <a:rPr lang="en-US" sz="2400" dirty="0">
-                <a:latin typeface="Bahnschrift" panose="020B0502040204020203" pitchFamily="34" charset="0"/>
-              </a:rPr>
-              <a:t>Once that is done, the old Controller with the Ray Interactor can be deleted.</a:t>
-            </a:r>
-          </a:p>
-          <a:p>
-            <a:pPr lvl="1"/>
-            <a:r>
-              <a:rPr lang="en-US" sz="2000" dirty="0">
-                <a:latin typeface="Bahnschrift" panose="020B0502040204020203" pitchFamily="34" charset="0"/>
-              </a:rPr>
-              <a:t>It would be a good idea to rename the new Controller object to something like ‘Right Controller’ to keep things organized.</a:t>
-            </a:r>
-          </a:p>
-          <a:p>
-            <a:endParaRPr lang="en-US" sz="2400" dirty="0">
-              <a:latin typeface="Bahnschrift" panose="020B0502040204020203" pitchFamily="34" charset="0"/>
-            </a:endParaRPr>
-          </a:p>
-          <a:p>
-            <a:r>
-              <a:rPr lang="en-US" sz="2400" dirty="0">
-                <a:latin typeface="Bahnschrift" panose="020B0502040204020203" pitchFamily="34" charset="0"/>
-              </a:rPr>
-              <a:t>If the design of your game requires both of your controllers to use Direct Interactors, repeat the above steps for the other controller as well.</a:t>
-            </a:r>
-          </a:p>
-          <a:p>
-            <a:endParaRPr lang="en-US" sz="2400" dirty="0">
-              <a:latin typeface="Bahnschrift" panose="020B0502040204020203" pitchFamily="34" charset="0"/>
-            </a:endParaRPr>
-          </a:p>
-          <a:p>
-            <a:r>
-              <a:rPr lang="en-US" sz="2400" dirty="0">
-                <a:latin typeface="Bahnschrift" panose="020B0502040204020203" pitchFamily="34" charset="0"/>
-              </a:rPr>
-              <a:t>For this lesson, only one controller needs to be ‘converted’ to a Direct Interactor.</a:t>
-            </a:r>
-          </a:p>
-          <a:p>
-            <a:pPr lvl="1"/>
-            <a:r>
-              <a:rPr lang="en-US" sz="2000" dirty="0">
-                <a:latin typeface="Bahnschrift" panose="020B0502040204020203" pitchFamily="34" charset="0"/>
-              </a:rPr>
-              <a:t>We will use the Ray Interactor next week.</a:t>
-            </a:r>
-          </a:p>
-        </p:txBody>
-      </p:sp>
-    </p:spTree>
-    <p:extLst>
-      <p:ext uri="{BB962C8B-B14F-4D97-AF65-F5344CB8AC3E}">
-        <p14:creationId xmlns:p14="http://schemas.microsoft.com/office/powerpoint/2010/main" val="1343221364"/>
-      </p:ext>
-    </p:extLst>
-  </p:cSld>
-  <p:clrMapOvr>
-    <a:masterClrMapping/>
-  </p:clrMapOvr>
-</p:sld>
-</file>
-
-<file path=ppt/slides/slide12.xml><?xml version="1.0" encoding="utf-8"?>
-<p:sld xmlns:a="http://schemas.openxmlformats.org/drawingml/2006/main" xmlns:r="http://schemas.openxmlformats.org/officeDocument/2006/relationships" xmlns:p="http://schemas.openxmlformats.org/presentationml/2006/main">
-  <p:cSld>
-    <p:spTree>
-      <p:nvGrpSpPr>
-        <p:cNvPr id="1" name=""/>
-        <p:cNvGrpSpPr/>
-        <p:nvPr/>
-      </p:nvGrpSpPr>
-      <p:grpSpPr>
-        <a:xfrm>
-          <a:off x="0" y="0"/>
-          <a:ext cx="0" cy="0"/>
-          <a:chOff x="0" y="0"/>
-          <a:chExt cx="0" cy="0"/>
-        </a:xfrm>
-      </p:grpSpPr>
-      <p:sp>
-        <p:nvSpPr>
           <p:cNvPr id="13" name="Title 1">
             <a:extLst>
               <a:ext uri="{FF2B5EF4-FFF2-40B4-BE49-F238E27FC236}">
@@ -4562,7 +4403,7 @@
 </p:sld>
 </file>
 
-<file path=ppt/slides/slide13.xml><?xml version="1.0" encoding="utf-8"?>
+<file path=ppt/slides/slide12.xml><?xml version="1.0" encoding="utf-8"?>
 <p:sld xmlns:a="http://schemas.openxmlformats.org/drawingml/2006/main" xmlns:r="http://schemas.openxmlformats.org/officeDocument/2006/relationships" xmlns:p="http://schemas.openxmlformats.org/presentationml/2006/main">
   <p:cSld>
     <p:spTree>
@@ -4759,7 +4600,7 @@
 </p:sld>
 </file>
 
-<file path=ppt/slides/slide14.xml><?xml version="1.0" encoding="utf-8"?>
+<file path=ppt/slides/slide13.xml><?xml version="1.0" encoding="utf-8"?>
 <p:sld xmlns:a="http://schemas.openxmlformats.org/drawingml/2006/main" xmlns:r="http://schemas.openxmlformats.org/officeDocument/2006/relationships" xmlns:p="http://schemas.openxmlformats.org/presentationml/2006/main">
   <p:cSld>
     <p:spTree>
@@ -4946,7 +4787,7 @@
 </p:sld>
 </file>
 
-<file path=ppt/slides/slide15.xml><?xml version="1.0" encoding="utf-8"?>
+<file path=ppt/slides/slide14.xml><?xml version="1.0" encoding="utf-8"?>
 <p:sld xmlns:a="http://schemas.openxmlformats.org/drawingml/2006/main" xmlns:r="http://schemas.openxmlformats.org/officeDocument/2006/relationships" xmlns:p="http://schemas.openxmlformats.org/presentationml/2006/main">
   <p:cSld>
     <p:spTree>
@@ -5138,7 +4979,7 @@
 </p:sld>
 </file>
 
-<file path=ppt/slides/slide16.xml><?xml version="1.0" encoding="utf-8"?>
+<file path=ppt/slides/slide15.xml><?xml version="1.0" encoding="utf-8"?>
 <p:sld xmlns:a="http://schemas.openxmlformats.org/drawingml/2006/main" xmlns:r="http://schemas.openxmlformats.org/officeDocument/2006/relationships" xmlns:p="http://schemas.openxmlformats.org/presentationml/2006/main">
   <p:cSld>
     <p:spTree>
@@ -5285,7 +5126,7 @@
 </p:sld>
 </file>
 
-<file path=ppt/slides/slide17.xml><?xml version="1.0" encoding="utf-8"?>
+<file path=ppt/slides/slide16.xml><?xml version="1.0" encoding="utf-8"?>
 <p:sld xmlns:a="http://schemas.openxmlformats.org/drawingml/2006/main" xmlns:r="http://schemas.openxmlformats.org/officeDocument/2006/relationships" xmlns:p="http://schemas.openxmlformats.org/presentationml/2006/main">
   <p:cSld>
     <p:spTree>
@@ -5423,7 +5264,7 @@
 </p:sld>
 </file>
 
-<file path=ppt/slides/slide18.xml><?xml version="1.0" encoding="utf-8"?>
+<file path=ppt/slides/slide17.xml><?xml version="1.0" encoding="utf-8"?>
 <p:sld xmlns:a="http://schemas.openxmlformats.org/drawingml/2006/main" xmlns:r="http://schemas.openxmlformats.org/officeDocument/2006/relationships" xmlns:p="http://schemas.openxmlformats.org/presentationml/2006/main">
   <p:cSld>
     <p:spTree>
@@ -5580,6 +5421,77 @@
 </p:sld>
 </file>
 
+<file path=ppt/slides/slide18.xml><?xml version="1.0" encoding="utf-8"?>
+<p:sld xmlns:a="http://schemas.openxmlformats.org/drawingml/2006/main" xmlns:r="http://schemas.openxmlformats.org/officeDocument/2006/relationships" xmlns:p="http://schemas.openxmlformats.org/presentationml/2006/main">
+  <p:cSld>
+    <p:spTree>
+      <p:nvGrpSpPr>
+        <p:cNvPr id="1" name=""/>
+        <p:cNvGrpSpPr/>
+        <p:nvPr/>
+      </p:nvGrpSpPr>
+      <p:grpSpPr>
+        <a:xfrm>
+          <a:off x="0" y="0"/>
+          <a:ext cx="0" cy="0"/>
+          <a:chOff x="0" y="0"/>
+          <a:chExt cx="0" cy="0"/>
+        </a:xfrm>
+      </p:grpSpPr>
+      <p:sp>
+        <p:nvSpPr>
+          <p:cNvPr id="13" name="Title 1">
+            <a:extLst>
+              <a:ext uri="{FF2B5EF4-FFF2-40B4-BE49-F238E27FC236}">
+                <a16:creationId xmlns:a16="http://schemas.microsoft.com/office/drawing/2014/main" id="{AFBCB11E-07F3-48B7-8B47-7E50039C99D4}"/>
+              </a:ext>
+            </a:extLst>
+          </p:cNvPr>
+          <p:cNvSpPr>
+            <a:spLocks noGrp="1"/>
+          </p:cNvSpPr>
+          <p:nvPr>
+            <p:ph type="title"/>
+          </p:nvPr>
+        </p:nvSpPr>
+        <p:spPr>
+          <a:xfrm>
+            <a:off x="838200" y="365125"/>
+            <a:ext cx="10515600" cy="5229340"/>
+          </a:xfrm>
+        </p:spPr>
+        <p:txBody>
+          <a:bodyPr>
+            <a:normAutofit/>
+          </a:bodyPr>
+          <a:lstStyle/>
+          <a:p>
+            <a:pPr algn="ctr"/>
+            <a:r>
+              <a:rPr lang="en-US" sz="8000" dirty="0">
+                <a:solidFill>
+                  <a:srgbClr val="00A79D"/>
+                </a:solidFill>
+                <a:latin typeface="Bahnschrift" panose="020B0502040204020203" pitchFamily="34" charset="0"/>
+              </a:rPr>
+              <a:t>Demo Time!</a:t>
+            </a:r>
+          </a:p>
+        </p:txBody>
+      </p:sp>
+    </p:spTree>
+    <p:extLst>
+      <p:ext uri="{BB962C8B-B14F-4D97-AF65-F5344CB8AC3E}">
+        <p14:creationId xmlns:p14="http://schemas.microsoft.com/office/powerpoint/2010/main" val="3569272042"/>
+      </p:ext>
+    </p:extLst>
+  </p:cSld>
+  <p:clrMapOvr>
+    <a:masterClrMapping/>
+  </p:clrMapOvr>
+</p:sld>
+</file>
+
 <file path=ppt/slides/slide19.xml><?xml version="1.0" encoding="utf-8"?>
 <p:sld xmlns:a="http://schemas.openxmlformats.org/drawingml/2006/main" xmlns:r="http://schemas.openxmlformats.org/officeDocument/2006/relationships" xmlns:p="http://schemas.openxmlformats.org/presentationml/2006/main">
   <p:cSld>
@@ -5599,10 +5511,10 @@
       </p:grpSpPr>
       <p:sp>
         <p:nvSpPr>
-          <p:cNvPr id="13" name="Title 1">
-            <a:extLst>
-              <a:ext uri="{FF2B5EF4-FFF2-40B4-BE49-F238E27FC236}">
-                <a16:creationId xmlns:a16="http://schemas.microsoft.com/office/drawing/2014/main" id="{AFBCB11E-07F3-48B7-8B47-7E50039C99D4}"/>
+          <p:cNvPr id="2" name="Title 1">
+            <a:extLst>
+              <a:ext uri="{FF2B5EF4-FFF2-40B4-BE49-F238E27FC236}">
+                <a16:creationId xmlns:a16="http://schemas.microsoft.com/office/drawing/2014/main" id="{264E5970-3812-4B23-BF67-26CB2C14C1EB}"/>
               </a:ext>
             </a:extLst>
           </p:cNvPr>
@@ -5613,35 +5525,92 @@
             <p:ph type="title"/>
           </p:nvPr>
         </p:nvSpPr>
-        <p:spPr>
-          <a:xfrm>
-            <a:off x="838200" y="365125"/>
-            <a:ext cx="10515600" cy="5229340"/>
-          </a:xfrm>
-        </p:spPr>
+        <p:spPr/>
         <p:txBody>
           <a:bodyPr>
             <a:normAutofit/>
           </a:bodyPr>
           <a:lstStyle/>
           <a:p>
-            <a:pPr algn="ctr"/>
-            <a:r>
-              <a:rPr lang="en-US" sz="8000" dirty="0">
-                <a:solidFill>
-                  <a:srgbClr val="00A79D"/>
-                </a:solidFill>
-                <a:latin typeface="Bahnschrift" panose="020B0502040204020203" pitchFamily="34" charset="0"/>
-              </a:rPr>
-              <a:t>Demo Time!</a:t>
-            </a:r>
+            <a:r>
+              <a:rPr lang="en-US" dirty="0">
+                <a:latin typeface="Bahnschrift" panose="020B0502040204020203" pitchFamily="34" charset="0"/>
+              </a:rPr>
+              <a:t>Event based Interactions</a:t>
+            </a:r>
+          </a:p>
+        </p:txBody>
+      </p:sp>
+      <p:sp>
+        <p:nvSpPr>
+          <p:cNvPr id="3" name="Content Placeholder 2">
+            <a:extLst>
+              <a:ext uri="{FF2B5EF4-FFF2-40B4-BE49-F238E27FC236}">
+                <a16:creationId xmlns:a16="http://schemas.microsoft.com/office/drawing/2014/main" id="{49FD8C2D-32F9-4E05-B1D6-A27CCD110BEC}"/>
+              </a:ext>
+            </a:extLst>
+          </p:cNvPr>
+          <p:cNvSpPr>
+            <a:spLocks noGrp="1"/>
+          </p:cNvSpPr>
+          <p:nvPr>
+            <p:ph idx="1"/>
+          </p:nvPr>
+        </p:nvSpPr>
+        <p:spPr>
+          <a:xfrm>
+            <a:off x="838199" y="1690688"/>
+            <a:ext cx="10515600" cy="4651923"/>
+          </a:xfrm>
+        </p:spPr>
+        <p:txBody>
+          <a:bodyPr>
+            <a:normAutofit/>
+          </a:bodyPr>
+          <a:lstStyle/>
+          <a:p>
+            <a:r>
+              <a:rPr lang="en-US" sz="2400" dirty="0">
+                <a:latin typeface="Bahnschrift" panose="020B0502040204020203" pitchFamily="34" charset="0"/>
+              </a:rPr>
+              <a:t>Aside from highlighting an Interactable, we can use these events to implement other functionality.</a:t>
+            </a:r>
+          </a:p>
+          <a:p>
+            <a:endParaRPr lang="en-US" sz="2400" dirty="0">
+              <a:latin typeface="Bahnschrift" panose="020B0502040204020203" pitchFamily="34" charset="0"/>
+            </a:endParaRPr>
+          </a:p>
+          <a:p>
+            <a:r>
+              <a:rPr lang="en-US" sz="2400" dirty="0">
+                <a:latin typeface="Bahnschrift" panose="020B0502040204020203" pitchFamily="34" charset="0"/>
+              </a:rPr>
+              <a:t>We can use the Select Entered event to call a function when the Grip button is pressed while over an Interactable.</a:t>
+            </a:r>
+          </a:p>
+          <a:p>
+            <a:endParaRPr lang="en-US" sz="2400" dirty="0">
+              <a:latin typeface="Bahnschrift" panose="020B0502040204020203" pitchFamily="34" charset="0"/>
+            </a:endParaRPr>
+          </a:p>
+          <a:p>
+            <a:r>
+              <a:rPr lang="en-US" sz="2400" dirty="0">
+                <a:latin typeface="Bahnschrift" panose="020B0502040204020203" pitchFamily="34" charset="0"/>
+              </a:rPr>
+              <a:t>Let’s see how we can use this to create a light switch.</a:t>
+            </a:r>
+            <a:endParaRPr lang="en-US" sz="2000" dirty="0">
+              <a:latin typeface="Bahnschrift" panose="020B0502040204020203" pitchFamily="34" charset="0"/>
+            </a:endParaRPr>
           </a:p>
         </p:txBody>
       </p:sp>
     </p:spTree>
     <p:extLst>
       <p:ext uri="{BB962C8B-B14F-4D97-AF65-F5344CB8AC3E}">
-        <p14:creationId xmlns:p14="http://schemas.microsoft.com/office/powerpoint/2010/main" val="3569272042"/>
+        <p14:creationId xmlns:p14="http://schemas.microsoft.com/office/powerpoint/2010/main" val="2014887875"/>
       </p:ext>
     </p:extLst>
   </p:cSld>
@@ -5695,7 +5664,7 @@
               <a:rPr lang="en-US" dirty="0">
                 <a:latin typeface="Bahnschrift" panose="020B0502040204020203" pitchFamily="34" charset="0"/>
               </a:rPr>
-              <a:t>NOTES</a:t>
+              <a:t>Recap</a:t>
             </a:r>
           </a:p>
         </p:txBody>
@@ -5724,7 +5693,7 @@
         </p:spPr>
         <p:txBody>
           <a:bodyPr>
-            <a:normAutofit fontScale="85000" lnSpcReduction="20000"/>
+            <a:normAutofit/>
           </a:bodyPr>
           <a:lstStyle/>
           <a:p>
@@ -5732,205 +5701,31 @@
               <a:rPr lang="en-US" sz="2400" dirty="0">
                 <a:latin typeface="Bahnschrift" panose="020B0502040204020203" pitchFamily="34" charset="0"/>
               </a:rPr>
-              <a:t>3 Types of interactions:</a:t>
+              <a:t>Last week, we talked about how the XRTK package gives us access to its Interactor and Interactable system.</a:t>
             </a:r>
           </a:p>
           <a:p>
             <a:pPr lvl="1"/>
             <a:r>
               <a:rPr lang="en-US" sz="2000" dirty="0">
-                <a:solidFill>
-                  <a:srgbClr val="FF0000"/>
-                </a:solidFill>
-                <a:latin typeface="Bahnschrift" panose="020B0502040204020203" pitchFamily="34" charset="0"/>
-              </a:rPr>
-              <a:t>Point and trigger (activate)</a:t>
-            </a:r>
-          </a:p>
-          <a:p>
-            <a:pPr lvl="2"/>
-            <a:r>
-              <a:rPr lang="en-US" sz="1600" dirty="0">
-                <a:solidFill>
-                  <a:srgbClr val="FF0000"/>
-                </a:solidFill>
-                <a:latin typeface="Bahnschrift" panose="020B0502040204020203" pitchFamily="34" charset="0"/>
-              </a:rPr>
-              <a:t>Something like secondary feature/function</a:t>
+                <a:latin typeface="Bahnschrift" panose="020B0502040204020203" pitchFamily="34" charset="0"/>
+              </a:rPr>
+              <a:t>Interactors are the VR controllers used by the player.</a:t>
             </a:r>
           </a:p>
           <a:p>
             <a:pPr lvl="1"/>
             <a:r>
+              <a:rPr lang="en-US" sz="2000" dirty="0" err="1">
+                <a:latin typeface="Bahnschrift" panose="020B0502040204020203" pitchFamily="34" charset="0"/>
+              </a:rPr>
+              <a:t>Interactables</a:t>
+            </a:r>
+            <a:r>
               <a:rPr lang="en-US" sz="2000" dirty="0">
-                <a:solidFill>
-                  <a:srgbClr val="FF0000"/>
-                </a:solidFill>
-                <a:latin typeface="Bahnschrift" panose="020B0502040204020203" pitchFamily="34" charset="0"/>
-              </a:rPr>
-              <a:t>Grab and trigger</a:t>
-            </a:r>
-          </a:p>
-          <a:p>
-            <a:pPr lvl="2"/>
-            <a:r>
-              <a:rPr lang="en-US" sz="1600" dirty="0">
-                <a:solidFill>
-                  <a:srgbClr val="FF0000"/>
-                </a:solidFill>
-                <a:latin typeface="Bahnschrift" panose="020B0502040204020203" pitchFamily="34" charset="0"/>
-              </a:rPr>
-              <a:t>Gun-like </a:t>
-            </a:r>
-            <a:r>
-              <a:rPr lang="en-US" sz="1600" dirty="0" err="1">
-                <a:solidFill>
-                  <a:srgbClr val="FF0000"/>
-                </a:solidFill>
-                <a:latin typeface="Bahnschrift" panose="020B0502040204020203" pitchFamily="34" charset="0"/>
-              </a:rPr>
-              <a:t>behaviour</a:t>
-            </a:r>
-            <a:endParaRPr lang="en-US" sz="1600" dirty="0">
-              <a:solidFill>
-                <a:srgbClr val="FF0000"/>
-              </a:solidFill>
-              <a:latin typeface="Bahnschrift" panose="020B0502040204020203" pitchFamily="34" charset="0"/>
-            </a:endParaRPr>
-          </a:p>
-          <a:p>
-            <a:pPr lvl="1"/>
-            <a:r>
-              <a:rPr lang="en-US" sz="2000" dirty="0">
-                <a:latin typeface="Bahnschrift" panose="020B0502040204020203" pitchFamily="34" charset="0"/>
-              </a:rPr>
-              <a:t>If cannot solve the trigger issue, instead go into how to use the events</a:t>
-            </a:r>
-          </a:p>
-          <a:p>
-            <a:pPr lvl="2"/>
-            <a:r>
-              <a:rPr lang="en-US" sz="1600" dirty="0">
-                <a:latin typeface="Bahnschrift" panose="020B0502040204020203" pitchFamily="34" charset="0"/>
-              </a:rPr>
-              <a:t>Select</a:t>
-            </a:r>
-          </a:p>
-          <a:p>
-            <a:pPr lvl="3"/>
-            <a:r>
-              <a:rPr lang="en-US" sz="1400" dirty="0">
-                <a:latin typeface="Bahnschrift" panose="020B0502040204020203" pitchFamily="34" charset="0"/>
-              </a:rPr>
-              <a:t>Maybe do something simple like a light switch</a:t>
-            </a:r>
-          </a:p>
-          <a:p>
-            <a:pPr lvl="2"/>
-            <a:r>
-              <a:rPr lang="en-US" sz="1600" dirty="0">
-                <a:latin typeface="Bahnschrift" panose="020B0502040204020203" pitchFamily="34" charset="0"/>
-              </a:rPr>
-              <a:t>Hover </a:t>
-            </a:r>
-          </a:p>
-          <a:p>
-            <a:pPr lvl="3"/>
-            <a:r>
-              <a:rPr lang="en-US" sz="1400" dirty="0">
-                <a:latin typeface="Bahnschrift" panose="020B0502040204020203" pitchFamily="34" charset="0"/>
-              </a:rPr>
-              <a:t>Do highlighting with material, most basic</a:t>
-            </a:r>
-          </a:p>
-          <a:p>
-            <a:pPr lvl="1"/>
-            <a:r>
-              <a:rPr lang="en-US" sz="2000" dirty="0">
-                <a:latin typeface="Bahnschrift" panose="020B0502040204020203" pitchFamily="34" charset="0"/>
-              </a:rPr>
-              <a:t>Grab and </a:t>
-            </a:r>
-            <a:r>
-              <a:rPr lang="en-US" sz="2000" dirty="0" err="1">
-                <a:latin typeface="Bahnschrift" panose="020B0502040204020203" pitchFamily="34" charset="0"/>
-              </a:rPr>
-              <a:t>onCollision</a:t>
-            </a:r>
-            <a:endParaRPr lang="en-US" sz="2000" dirty="0">
-              <a:latin typeface="Bahnschrift" panose="020B0502040204020203" pitchFamily="34" charset="0"/>
-            </a:endParaRPr>
-          </a:p>
-          <a:p>
-            <a:pPr lvl="2"/>
-            <a:r>
-              <a:rPr lang="en-US" sz="1600" dirty="0">
-                <a:latin typeface="Bahnschrift" panose="020B0502040204020203" pitchFamily="34" charset="0"/>
-              </a:rPr>
-              <a:t>Beat Saber-</a:t>
-            </a:r>
-            <a:r>
-              <a:rPr lang="en-US" sz="1600" dirty="0" err="1">
-                <a:latin typeface="Bahnschrift" panose="020B0502040204020203" pitchFamily="34" charset="0"/>
-              </a:rPr>
-              <a:t>esque</a:t>
-            </a:r>
-            <a:r>
-              <a:rPr lang="en-US" sz="1600" dirty="0">
-                <a:latin typeface="Bahnschrift" panose="020B0502040204020203" pitchFamily="34" charset="0"/>
-              </a:rPr>
-              <a:t> interaction</a:t>
-            </a:r>
-          </a:p>
-          <a:p>
-            <a:pPr lvl="2"/>
-            <a:r>
-              <a:rPr lang="en-US" sz="1600" dirty="0">
-                <a:latin typeface="Bahnschrift" panose="020B0502040204020203" pitchFamily="34" charset="0"/>
-              </a:rPr>
-              <a:t>Key and lock </a:t>
-            </a:r>
-            <a:r>
-              <a:rPr lang="en-US" sz="1600" dirty="0" err="1">
-                <a:latin typeface="Bahnschrift" panose="020B0502040204020203" pitchFamily="34" charset="0"/>
-              </a:rPr>
-              <a:t>behaviour</a:t>
-            </a:r>
-            <a:r>
-              <a:rPr lang="en-US" sz="1600" dirty="0">
-                <a:latin typeface="Bahnschrift" panose="020B0502040204020203" pitchFamily="34" charset="0"/>
-              </a:rPr>
-              <a:t>?</a:t>
-            </a:r>
-          </a:p>
-          <a:p>
-            <a:pPr lvl="2"/>
-            <a:r>
-              <a:rPr lang="en-US" sz="1600" dirty="0">
-                <a:latin typeface="Bahnschrift" panose="020B0502040204020203" pitchFamily="34" charset="0"/>
-              </a:rPr>
-              <a:t>Both need to be </a:t>
-            </a:r>
-            <a:r>
-              <a:rPr lang="en-US" sz="1600" dirty="0" err="1">
-                <a:latin typeface="Bahnschrift" panose="020B0502040204020203" pitchFamily="34" charset="0"/>
-              </a:rPr>
-              <a:t>rigidbody</a:t>
-            </a:r>
-            <a:r>
-              <a:rPr lang="en-US" sz="1600" dirty="0">
-                <a:latin typeface="Bahnschrift" panose="020B0502040204020203" pitchFamily="34" charset="0"/>
-              </a:rPr>
-              <a:t> only one can be kinematic</a:t>
-            </a:r>
-          </a:p>
-          <a:p>
-            <a:pPr lvl="2"/>
-            <a:r>
-              <a:rPr lang="en-US" sz="1600" dirty="0">
-                <a:latin typeface="Bahnschrift" panose="020B0502040204020203" pitchFamily="34" charset="0"/>
-              </a:rPr>
-              <a:t>Alternatively one can be trigger </a:t>
+                <a:latin typeface="Bahnschrift" panose="020B0502040204020203" pitchFamily="34" charset="0"/>
+              </a:rPr>
+              <a:t> are the objects that Interactors can act on.</a:t>
             </a:r>
           </a:p>
           <a:p>
@@ -5943,16 +5738,20 @@
               <a:rPr lang="en-US" sz="2400" dirty="0">
                 <a:latin typeface="Bahnschrift" panose="020B0502040204020203" pitchFamily="34" charset="0"/>
               </a:rPr>
-              <a:t>Go into how to implement teleport.</a:t>
-            </a:r>
-          </a:p>
-          <a:p>
-            <a:pPr lvl="1"/>
-            <a:r>
-              <a:rPr lang="en-US" sz="2000" dirty="0">
-                <a:latin typeface="Bahnschrift" panose="020B0502040204020203" pitchFamily="34" charset="0"/>
-              </a:rPr>
-              <a:t>Detect joystick move, toggle ray interactor, release to move.</a:t>
+              <a:t>Using that system, we looked at how we could quickly create a grabbing interaction.</a:t>
+            </a:r>
+          </a:p>
+          <a:p>
+            <a:endParaRPr lang="en-US" sz="2400" dirty="0">
+              <a:latin typeface="Bahnschrift" panose="020B0502040204020203" pitchFamily="34" charset="0"/>
+            </a:endParaRPr>
+          </a:p>
+          <a:p>
+            <a:r>
+              <a:rPr lang="en-US" sz="2400" dirty="0">
+                <a:latin typeface="Bahnschrift" panose="020B0502040204020203" pitchFamily="34" charset="0"/>
+              </a:rPr>
+              <a:t>Today, we will look at how we can implement other interactions as well.</a:t>
             </a:r>
           </a:p>
         </p:txBody>
@@ -5960,7 +5759,7 @@
     </p:spTree>
     <p:extLst>
       <p:ext uri="{BB962C8B-B14F-4D97-AF65-F5344CB8AC3E}">
-        <p14:creationId xmlns:p14="http://schemas.microsoft.com/office/powerpoint/2010/main" val="3864890610"/>
+        <p14:creationId xmlns:p14="http://schemas.microsoft.com/office/powerpoint/2010/main" val="1632692131"/>
       </p:ext>
     </p:extLst>
   </p:cSld>
@@ -5971,134 +5770,6 @@
 </file>
 
 <file path=ppt/slides/slide20.xml><?xml version="1.0" encoding="utf-8"?>
-<p:sld xmlns:a="http://schemas.openxmlformats.org/drawingml/2006/main" xmlns:r="http://schemas.openxmlformats.org/officeDocument/2006/relationships" xmlns:p="http://schemas.openxmlformats.org/presentationml/2006/main">
-  <p:cSld>
-    <p:spTree>
-      <p:nvGrpSpPr>
-        <p:cNvPr id="1" name=""/>
-        <p:cNvGrpSpPr/>
-        <p:nvPr/>
-      </p:nvGrpSpPr>
-      <p:grpSpPr>
-        <a:xfrm>
-          <a:off x="0" y="0"/>
-          <a:ext cx="0" cy="0"/>
-          <a:chOff x="0" y="0"/>
-          <a:chExt cx="0" cy="0"/>
-        </a:xfrm>
-      </p:grpSpPr>
-      <p:sp>
-        <p:nvSpPr>
-          <p:cNvPr id="2" name="Title 1">
-            <a:extLst>
-              <a:ext uri="{FF2B5EF4-FFF2-40B4-BE49-F238E27FC236}">
-                <a16:creationId xmlns:a16="http://schemas.microsoft.com/office/drawing/2014/main" id="{264E5970-3812-4B23-BF67-26CB2C14C1EB}"/>
-              </a:ext>
-            </a:extLst>
-          </p:cNvPr>
-          <p:cNvSpPr>
-            <a:spLocks noGrp="1"/>
-          </p:cNvSpPr>
-          <p:nvPr>
-            <p:ph type="title"/>
-          </p:nvPr>
-        </p:nvSpPr>
-        <p:spPr/>
-        <p:txBody>
-          <a:bodyPr>
-            <a:normAutofit/>
-          </a:bodyPr>
-          <a:lstStyle/>
-          <a:p>
-            <a:r>
-              <a:rPr lang="en-US" dirty="0">
-                <a:latin typeface="Bahnschrift" panose="020B0502040204020203" pitchFamily="34" charset="0"/>
-              </a:rPr>
-              <a:t>Event based Interactions</a:t>
-            </a:r>
-          </a:p>
-        </p:txBody>
-      </p:sp>
-      <p:sp>
-        <p:nvSpPr>
-          <p:cNvPr id="3" name="Content Placeholder 2">
-            <a:extLst>
-              <a:ext uri="{FF2B5EF4-FFF2-40B4-BE49-F238E27FC236}">
-                <a16:creationId xmlns:a16="http://schemas.microsoft.com/office/drawing/2014/main" id="{49FD8C2D-32F9-4E05-B1D6-A27CCD110BEC}"/>
-              </a:ext>
-            </a:extLst>
-          </p:cNvPr>
-          <p:cNvSpPr>
-            <a:spLocks noGrp="1"/>
-          </p:cNvSpPr>
-          <p:nvPr>
-            <p:ph idx="1"/>
-          </p:nvPr>
-        </p:nvSpPr>
-        <p:spPr>
-          <a:xfrm>
-            <a:off x="838199" y="1690688"/>
-            <a:ext cx="10515600" cy="4651923"/>
-          </a:xfrm>
-        </p:spPr>
-        <p:txBody>
-          <a:bodyPr>
-            <a:normAutofit/>
-          </a:bodyPr>
-          <a:lstStyle/>
-          <a:p>
-            <a:r>
-              <a:rPr lang="en-US" sz="2400" dirty="0">
-                <a:latin typeface="Bahnschrift" panose="020B0502040204020203" pitchFamily="34" charset="0"/>
-              </a:rPr>
-              <a:t>Aside from highlighting an Interactable, we can use these events to implement other functionality.</a:t>
-            </a:r>
-          </a:p>
-          <a:p>
-            <a:endParaRPr lang="en-US" sz="2400" dirty="0">
-              <a:latin typeface="Bahnschrift" panose="020B0502040204020203" pitchFamily="34" charset="0"/>
-            </a:endParaRPr>
-          </a:p>
-          <a:p>
-            <a:r>
-              <a:rPr lang="en-US" sz="2400" dirty="0">
-                <a:latin typeface="Bahnschrift" panose="020B0502040204020203" pitchFamily="34" charset="0"/>
-              </a:rPr>
-              <a:t>We can use the Select Entered event to call a function when the Grip button is pressed while over an Interactable.</a:t>
-            </a:r>
-          </a:p>
-          <a:p>
-            <a:endParaRPr lang="en-US" sz="2400" dirty="0">
-              <a:latin typeface="Bahnschrift" panose="020B0502040204020203" pitchFamily="34" charset="0"/>
-            </a:endParaRPr>
-          </a:p>
-          <a:p>
-            <a:r>
-              <a:rPr lang="en-US" sz="2400" dirty="0">
-                <a:latin typeface="Bahnschrift" panose="020B0502040204020203" pitchFamily="34" charset="0"/>
-              </a:rPr>
-              <a:t>Let’s see how we can use this to create a light switch.</a:t>
-            </a:r>
-            <a:endParaRPr lang="en-US" sz="2000" dirty="0">
-              <a:latin typeface="Bahnschrift" panose="020B0502040204020203" pitchFamily="34" charset="0"/>
-            </a:endParaRPr>
-          </a:p>
-        </p:txBody>
-      </p:sp>
-    </p:spTree>
-    <p:extLst>
-      <p:ext uri="{BB962C8B-B14F-4D97-AF65-F5344CB8AC3E}">
-        <p14:creationId xmlns:p14="http://schemas.microsoft.com/office/powerpoint/2010/main" val="2014887875"/>
-      </p:ext>
-    </p:extLst>
-  </p:cSld>
-  <p:clrMapOvr>
-    <a:masterClrMapping/>
-  </p:clrMapOvr>
-</p:sld>
-</file>
-
-<file path=ppt/slides/slide21.xml><?xml version="1.0" encoding="utf-8"?>
 <p:sld xmlns:a="http://schemas.openxmlformats.org/drawingml/2006/main" xmlns:r="http://schemas.openxmlformats.org/officeDocument/2006/relationships" xmlns:p="http://schemas.openxmlformats.org/presentationml/2006/main">
   <p:cSld>
     <p:spTree>
@@ -6286,7 +5957,7 @@
 </p:sld>
 </file>
 
-<file path=ppt/slides/slide22.xml><?xml version="1.0" encoding="utf-8"?>
+<file path=ppt/slides/slide21.xml><?xml version="1.0" encoding="utf-8"?>
 <p:sld xmlns:a="http://schemas.openxmlformats.org/drawingml/2006/main" xmlns:r="http://schemas.openxmlformats.org/officeDocument/2006/relationships" xmlns:p="http://schemas.openxmlformats.org/presentationml/2006/main">
   <p:cSld>
     <p:spTree>
@@ -6494,6 +6165,163 @@
     <p:extLst>
       <p:ext uri="{BB962C8B-B14F-4D97-AF65-F5344CB8AC3E}">
         <p14:creationId xmlns:p14="http://schemas.microsoft.com/office/powerpoint/2010/main" val="3157930310"/>
+      </p:ext>
+    </p:extLst>
+  </p:cSld>
+  <p:clrMapOvr>
+    <a:masterClrMapping/>
+  </p:clrMapOvr>
+</p:sld>
+</file>
+
+<file path=ppt/slides/slide22.xml><?xml version="1.0" encoding="utf-8"?>
+<p:sld xmlns:a="http://schemas.openxmlformats.org/drawingml/2006/main" xmlns:r="http://schemas.openxmlformats.org/officeDocument/2006/relationships" xmlns:p="http://schemas.openxmlformats.org/presentationml/2006/main">
+  <p:cSld>
+    <p:spTree>
+      <p:nvGrpSpPr>
+        <p:cNvPr id="1" name=""/>
+        <p:cNvGrpSpPr/>
+        <p:nvPr/>
+      </p:nvGrpSpPr>
+      <p:grpSpPr>
+        <a:xfrm>
+          <a:off x="0" y="0"/>
+          <a:ext cx="0" cy="0"/>
+          <a:chOff x="0" y="0"/>
+          <a:chExt cx="0" cy="0"/>
+        </a:xfrm>
+      </p:grpSpPr>
+      <p:pic>
+        <p:nvPicPr>
+          <p:cNvPr id="6" name="Picture 5">
+            <a:extLst>
+              <a:ext uri="{FF2B5EF4-FFF2-40B4-BE49-F238E27FC236}">
+                <a16:creationId xmlns:a16="http://schemas.microsoft.com/office/drawing/2014/main" id="{757F7F6D-38E5-4778-A5EB-A843AF191FF7}"/>
+              </a:ext>
+            </a:extLst>
+          </p:cNvPr>
+          <p:cNvPicPr>
+            <a:picLocks noChangeAspect="1"/>
+          </p:cNvPicPr>
+          <p:nvPr/>
+        </p:nvPicPr>
+        <p:blipFill>
+          <a:blip r:embed="rId2"/>
+          <a:stretch>
+            <a:fillRect/>
+          </a:stretch>
+        </p:blipFill>
+        <p:spPr>
+          <a:xfrm>
+            <a:off x="6096000" y="1690689"/>
+            <a:ext cx="6095999" cy="3786119"/>
+          </a:xfrm>
+          <a:prstGeom prst="rect">
+            <a:avLst/>
+          </a:prstGeom>
+        </p:spPr>
+      </p:pic>
+      <p:sp>
+        <p:nvSpPr>
+          <p:cNvPr id="2" name="Title 1">
+            <a:extLst>
+              <a:ext uri="{FF2B5EF4-FFF2-40B4-BE49-F238E27FC236}">
+                <a16:creationId xmlns:a16="http://schemas.microsoft.com/office/drawing/2014/main" id="{264E5970-3812-4B23-BF67-26CB2C14C1EB}"/>
+              </a:ext>
+            </a:extLst>
+          </p:cNvPr>
+          <p:cNvSpPr>
+            <a:spLocks noGrp="1"/>
+          </p:cNvSpPr>
+          <p:nvPr>
+            <p:ph type="title"/>
+          </p:nvPr>
+        </p:nvSpPr>
+        <p:spPr/>
+        <p:txBody>
+          <a:bodyPr>
+            <a:normAutofit/>
+          </a:bodyPr>
+          <a:lstStyle/>
+          <a:p>
+            <a:r>
+              <a:rPr lang="en-US" dirty="0">
+                <a:latin typeface="Bahnschrift" panose="020B0502040204020203" pitchFamily="34" charset="0"/>
+              </a:rPr>
+              <a:t>Event based Interactions</a:t>
+            </a:r>
+          </a:p>
+        </p:txBody>
+      </p:sp>
+      <p:sp>
+        <p:nvSpPr>
+          <p:cNvPr id="3" name="Content Placeholder 2">
+            <a:extLst>
+              <a:ext uri="{FF2B5EF4-FFF2-40B4-BE49-F238E27FC236}">
+                <a16:creationId xmlns:a16="http://schemas.microsoft.com/office/drawing/2014/main" id="{49FD8C2D-32F9-4E05-B1D6-A27CCD110BEC}"/>
+              </a:ext>
+            </a:extLst>
+          </p:cNvPr>
+          <p:cNvSpPr>
+            <a:spLocks noGrp="1"/>
+          </p:cNvSpPr>
+          <p:nvPr>
+            <p:ph idx="1"/>
+          </p:nvPr>
+        </p:nvSpPr>
+        <p:spPr>
+          <a:xfrm>
+            <a:off x="838199" y="1690688"/>
+            <a:ext cx="5257801" cy="4651923"/>
+          </a:xfrm>
+        </p:spPr>
+        <p:txBody>
+          <a:bodyPr>
+            <a:normAutofit/>
+          </a:bodyPr>
+          <a:lstStyle/>
+          <a:p>
+            <a:r>
+              <a:rPr lang="en-US" sz="2400" dirty="0">
+                <a:latin typeface="Bahnschrift" panose="020B0502040204020203" pitchFamily="34" charset="0"/>
+              </a:rPr>
+              <a:t>We will drag and drop the Light that we want to toggle later in the scene.</a:t>
+            </a:r>
+          </a:p>
+          <a:p>
+            <a:endParaRPr lang="en-US" sz="2400" dirty="0">
+              <a:latin typeface="Bahnschrift" panose="020B0502040204020203" pitchFamily="34" charset="0"/>
+            </a:endParaRPr>
+          </a:p>
+          <a:p>
+            <a:r>
+              <a:rPr lang="en-US" sz="2400" dirty="0">
+                <a:latin typeface="Bahnschrift" panose="020B0502040204020203" pitchFamily="34" charset="0"/>
+              </a:rPr>
+              <a:t>In the </a:t>
+            </a:r>
+            <a:r>
+              <a:rPr lang="en-US" sz="2400" dirty="0" err="1">
+                <a:latin typeface="Bahnschrift" panose="020B0502040204020203" pitchFamily="34" charset="0"/>
+              </a:rPr>
+              <a:t>ToggleLight</a:t>
+            </a:r>
+            <a:r>
+              <a:rPr lang="en-US" sz="2400" dirty="0">
+                <a:latin typeface="Bahnschrift" panose="020B0502040204020203" pitchFamily="34" charset="0"/>
+              </a:rPr>
+              <a:t> function, we will set the ‘enabled’ property of the Light variable to the opposite of its current value.</a:t>
+            </a:r>
+            <a:endParaRPr lang="en-US" sz="2000" dirty="0">
+              <a:latin typeface="Bahnschrift" panose="020B0502040204020203" pitchFamily="34" charset="0"/>
+            </a:endParaRPr>
+          </a:p>
+        </p:txBody>
+      </p:sp>
+    </p:spTree>
+    <p:extLst>
+      <p:ext uri="{BB962C8B-B14F-4D97-AF65-F5344CB8AC3E}">
+        <p14:creationId xmlns:p14="http://schemas.microsoft.com/office/powerpoint/2010/main" val="1265359159"/>
       </p:ext>
     </p:extLst>
   </p:cSld>
@@ -6522,10 +6350,10 @@
       </p:grpSpPr>
       <p:pic>
         <p:nvPicPr>
-          <p:cNvPr id="6" name="Picture 5">
-            <a:extLst>
-              <a:ext uri="{FF2B5EF4-FFF2-40B4-BE49-F238E27FC236}">
-                <a16:creationId xmlns:a16="http://schemas.microsoft.com/office/drawing/2014/main" id="{757F7F6D-38E5-4778-A5EB-A843AF191FF7}"/>
+          <p:cNvPr id="5" name="Picture 4">
+            <a:extLst>
+              <a:ext uri="{FF2B5EF4-FFF2-40B4-BE49-F238E27FC236}">
+                <a16:creationId xmlns:a16="http://schemas.microsoft.com/office/drawing/2014/main" id="{05EB6AB7-F62B-46BB-935B-31C4018EF585}"/>
               </a:ext>
             </a:extLst>
           </p:cNvPr>
@@ -6542,8 +6370,8 @@
         </p:blipFill>
         <p:spPr>
           <a:xfrm>
-            <a:off x="6096000" y="1690689"/>
-            <a:ext cx="6095999" cy="3786119"/>
+            <a:off x="6819900" y="1685926"/>
+            <a:ext cx="5372100" cy="4533900"/>
           </a:xfrm>
           <a:prstGeom prst="rect">
             <a:avLst/>
@@ -6601,7 +6429,7 @@
         <p:spPr>
           <a:xfrm>
             <a:off x="838199" y="1690688"/>
-            <a:ext cx="5257801" cy="4651923"/>
+            <a:ext cx="5962651" cy="4651923"/>
           </a:xfrm>
         </p:spPr>
         <p:txBody>
@@ -6614,7 +6442,28 @@
               <a:rPr lang="en-US" sz="2400" dirty="0">
                 <a:latin typeface="Bahnschrift" panose="020B0502040204020203" pitchFamily="34" charset="0"/>
               </a:rPr>
-              <a:t>We will drag and drop the Light that we want to toggle later in the scene.</a:t>
+              <a:t>Back in the Unity scene, link a Light in your scene to the variable in the </a:t>
+            </a:r>
+            <a:r>
+              <a:rPr lang="en-US" sz="2400" dirty="0" err="1">
+                <a:latin typeface="Bahnschrift" panose="020B0502040204020203" pitchFamily="34" charset="0"/>
+              </a:rPr>
+              <a:t>LightSwitch</a:t>
+            </a:r>
+            <a:r>
+              <a:rPr lang="en-US" sz="2400" dirty="0">
+                <a:latin typeface="Bahnschrift" panose="020B0502040204020203" pitchFamily="34" charset="0"/>
+              </a:rPr>
+              <a:t> component.</a:t>
+            </a:r>
+          </a:p>
+          <a:p>
+            <a:pPr lvl="1"/>
+            <a:r>
+              <a:rPr lang="en-US" sz="2000" dirty="0">
+                <a:latin typeface="Bahnschrift" panose="020B0502040204020203" pitchFamily="34" charset="0"/>
+              </a:rPr>
+              <a:t>I have chosen to use the default Directional Light for this example.</a:t>
             </a:r>
           </a:p>
           <a:p>
@@ -6627,30 +6476,15 @@
               <a:rPr lang="en-US" sz="2400" dirty="0">
                 <a:latin typeface="Bahnschrift" panose="020B0502040204020203" pitchFamily="34" charset="0"/>
               </a:rPr>
-              <a:t>In the </a:t>
-            </a:r>
-            <a:r>
-              <a:rPr lang="en-US" sz="2400" dirty="0" err="1">
-                <a:latin typeface="Bahnschrift" panose="020B0502040204020203" pitchFamily="34" charset="0"/>
-              </a:rPr>
-              <a:t>ToggleLight</a:t>
-            </a:r>
-            <a:r>
-              <a:rPr lang="en-US" sz="2400" dirty="0">
-                <a:latin typeface="Bahnschrift" panose="020B0502040204020203" pitchFamily="34" charset="0"/>
-              </a:rPr>
-              <a:t> function, we will set the ‘enabled’ property of the Light variable to the opposite of its current value.</a:t>
-            </a:r>
-            <a:endParaRPr lang="en-US" sz="2000" dirty="0">
-              <a:latin typeface="Bahnschrift" panose="020B0502040204020203" pitchFamily="34" charset="0"/>
-            </a:endParaRPr>
+              <a:t>Once the link is done, we can connect the function to the Select event of the Simple Interactable.</a:t>
+            </a:r>
           </a:p>
         </p:txBody>
       </p:sp>
     </p:spTree>
     <p:extLst>
       <p:ext uri="{BB962C8B-B14F-4D97-AF65-F5344CB8AC3E}">
-        <p14:creationId xmlns:p14="http://schemas.microsoft.com/office/powerpoint/2010/main" val="1265359159"/>
+        <p14:creationId xmlns:p14="http://schemas.microsoft.com/office/powerpoint/2010/main" val="1247438375"/>
       </p:ext>
     </p:extLst>
   </p:cSld>
@@ -6677,135 +6511,43 @@
           <a:chExt cx="0" cy="0"/>
         </a:xfrm>
       </p:grpSpPr>
-      <p:pic>
-        <p:nvPicPr>
-          <p:cNvPr id="5" name="Picture 4">
-            <a:extLst>
-              <a:ext uri="{FF2B5EF4-FFF2-40B4-BE49-F238E27FC236}">
-                <a16:creationId xmlns:a16="http://schemas.microsoft.com/office/drawing/2014/main" id="{05EB6AB7-F62B-46BB-935B-31C4018EF585}"/>
-              </a:ext>
-            </a:extLst>
-          </p:cNvPr>
-          <p:cNvPicPr>
-            <a:picLocks noChangeAspect="1"/>
-          </p:cNvPicPr>
-          <p:nvPr/>
-        </p:nvPicPr>
-        <p:blipFill>
-          <a:blip r:embed="rId2"/>
-          <a:stretch>
-            <a:fillRect/>
-          </a:stretch>
-        </p:blipFill>
+      <p:sp>
+        <p:nvSpPr>
+          <p:cNvPr id="13" name="Title 1">
+            <a:extLst>
+              <a:ext uri="{FF2B5EF4-FFF2-40B4-BE49-F238E27FC236}">
+                <a16:creationId xmlns:a16="http://schemas.microsoft.com/office/drawing/2014/main" id="{AFBCB11E-07F3-48B7-8B47-7E50039C99D4}"/>
+              </a:ext>
+            </a:extLst>
+          </p:cNvPr>
+          <p:cNvSpPr>
+            <a:spLocks noGrp="1"/>
+          </p:cNvSpPr>
+          <p:nvPr>
+            <p:ph type="title"/>
+          </p:nvPr>
+        </p:nvSpPr>
         <p:spPr>
           <a:xfrm>
-            <a:off x="6819900" y="1685926"/>
-            <a:ext cx="5372100" cy="4533900"/>
+            <a:off x="838200" y="365125"/>
+            <a:ext cx="10515600" cy="5229340"/>
           </a:xfrm>
-          <a:prstGeom prst="rect">
-            <a:avLst/>
-          </a:prstGeom>
         </p:spPr>
-      </p:pic>
-      <p:sp>
-        <p:nvSpPr>
-          <p:cNvPr id="2" name="Title 1">
-            <a:extLst>
-              <a:ext uri="{FF2B5EF4-FFF2-40B4-BE49-F238E27FC236}">
-                <a16:creationId xmlns:a16="http://schemas.microsoft.com/office/drawing/2014/main" id="{264E5970-3812-4B23-BF67-26CB2C14C1EB}"/>
-              </a:ext>
-            </a:extLst>
-          </p:cNvPr>
-          <p:cNvSpPr>
-            <a:spLocks noGrp="1"/>
-          </p:cNvSpPr>
-          <p:nvPr>
-            <p:ph type="title"/>
-          </p:nvPr>
-        </p:nvSpPr>
-        <p:spPr/>
         <p:txBody>
           <a:bodyPr>
             <a:normAutofit/>
           </a:bodyPr>
           <a:lstStyle/>
           <a:p>
-            <a:r>
-              <a:rPr lang="en-US" dirty="0">
-                <a:latin typeface="Bahnschrift" panose="020B0502040204020203" pitchFamily="34" charset="0"/>
-              </a:rPr>
-              <a:t>Event based Interactions</a:t>
-            </a:r>
-          </a:p>
-        </p:txBody>
-      </p:sp>
-      <p:sp>
-        <p:nvSpPr>
-          <p:cNvPr id="3" name="Content Placeholder 2">
-            <a:extLst>
-              <a:ext uri="{FF2B5EF4-FFF2-40B4-BE49-F238E27FC236}">
-                <a16:creationId xmlns:a16="http://schemas.microsoft.com/office/drawing/2014/main" id="{49FD8C2D-32F9-4E05-B1D6-A27CCD110BEC}"/>
-              </a:ext>
-            </a:extLst>
-          </p:cNvPr>
-          <p:cNvSpPr>
-            <a:spLocks noGrp="1"/>
-          </p:cNvSpPr>
-          <p:nvPr>
-            <p:ph idx="1"/>
-          </p:nvPr>
-        </p:nvSpPr>
-        <p:spPr>
-          <a:xfrm>
-            <a:off x="838199" y="1690688"/>
-            <a:ext cx="5962651" cy="4651923"/>
-          </a:xfrm>
-        </p:spPr>
-        <p:txBody>
-          <a:bodyPr>
-            <a:normAutofit/>
-          </a:bodyPr>
-          <a:lstStyle/>
-          <a:p>
-            <a:r>
-              <a:rPr lang="en-US" sz="2400" dirty="0">
-                <a:latin typeface="Bahnschrift" panose="020B0502040204020203" pitchFamily="34" charset="0"/>
-              </a:rPr>
-              <a:t>Back in the Unity scene, link a Light in your scene to the variable in the </a:t>
-            </a:r>
-            <a:r>
-              <a:rPr lang="en-US" sz="2400" dirty="0" err="1">
-                <a:latin typeface="Bahnschrift" panose="020B0502040204020203" pitchFamily="34" charset="0"/>
-              </a:rPr>
-              <a:t>LightSwitch</a:t>
-            </a:r>
-            <a:r>
-              <a:rPr lang="en-US" sz="2400" dirty="0">
-                <a:latin typeface="Bahnschrift" panose="020B0502040204020203" pitchFamily="34" charset="0"/>
-              </a:rPr>
-              <a:t> component.</a:t>
-            </a:r>
-          </a:p>
-          <a:p>
-            <a:pPr lvl="1"/>
-            <a:r>
-              <a:rPr lang="en-US" sz="2000" dirty="0">
-                <a:latin typeface="Bahnschrift" panose="020B0502040204020203" pitchFamily="34" charset="0"/>
-              </a:rPr>
-              <a:t>I have chosen to use the default Directional Light for this example.</a:t>
-            </a:r>
-          </a:p>
-          <a:p>
-            <a:endParaRPr lang="en-US" sz="2400" dirty="0">
-              <a:latin typeface="Bahnschrift" panose="020B0502040204020203" pitchFamily="34" charset="0"/>
-            </a:endParaRPr>
-          </a:p>
-          <a:p>
-            <a:r>
-              <a:rPr lang="en-US" sz="2400" dirty="0">
-                <a:latin typeface="Bahnschrift" panose="020B0502040204020203" pitchFamily="34" charset="0"/>
-              </a:rPr>
-              <a:t>Once the link is done, we can connect the function to the Select event of the Simple Interactable.</a:t>
+            <a:pPr algn="ctr"/>
+            <a:r>
+              <a:rPr lang="en-US" sz="8000" dirty="0">
+                <a:solidFill>
+                  <a:srgbClr val="00A79D"/>
+                </a:solidFill>
+                <a:latin typeface="Bahnschrift" panose="020B0502040204020203" pitchFamily="34" charset="0"/>
+              </a:rPr>
+              <a:t>Demo Time!</a:t>
             </a:r>
           </a:p>
         </p:txBody>
@@ -6813,7 +6555,7 @@
     </p:spTree>
     <p:extLst>
       <p:ext uri="{BB962C8B-B14F-4D97-AF65-F5344CB8AC3E}">
-        <p14:creationId xmlns:p14="http://schemas.microsoft.com/office/powerpoint/2010/main" val="1247438375"/>
+        <p14:creationId xmlns:p14="http://schemas.microsoft.com/office/powerpoint/2010/main" val="1808737497"/>
       </p:ext>
     </p:extLst>
   </p:cSld>
@@ -6842,10 +6584,10 @@
       </p:grpSpPr>
       <p:sp>
         <p:nvSpPr>
-          <p:cNvPr id="13" name="Title 1">
-            <a:extLst>
-              <a:ext uri="{FF2B5EF4-FFF2-40B4-BE49-F238E27FC236}">
-                <a16:creationId xmlns:a16="http://schemas.microsoft.com/office/drawing/2014/main" id="{AFBCB11E-07F3-48B7-8B47-7E50039C99D4}"/>
+          <p:cNvPr id="2" name="Title 1">
+            <a:extLst>
+              <a:ext uri="{FF2B5EF4-FFF2-40B4-BE49-F238E27FC236}">
+                <a16:creationId xmlns:a16="http://schemas.microsoft.com/office/drawing/2014/main" id="{264E5970-3812-4B23-BF67-26CB2C14C1EB}"/>
               </a:ext>
             </a:extLst>
           </p:cNvPr>
@@ -6856,27 +6598,89 @@
             <p:ph type="title"/>
           </p:nvPr>
         </p:nvSpPr>
-        <p:spPr>
-          <a:xfrm>
-            <a:off x="838200" y="365125"/>
-            <a:ext cx="10515600" cy="5229340"/>
-          </a:xfrm>
-        </p:spPr>
+        <p:spPr/>
         <p:txBody>
           <a:bodyPr>
             <a:normAutofit/>
           </a:bodyPr>
           <a:lstStyle/>
           <a:p>
-            <a:pPr algn="ctr"/>
-            <a:r>
-              <a:rPr lang="en-US" sz="8000" dirty="0">
-                <a:solidFill>
-                  <a:srgbClr val="00A79D"/>
-                </a:solidFill>
-                <a:latin typeface="Bahnschrift" panose="020B0502040204020203" pitchFamily="34" charset="0"/>
-              </a:rPr>
-              <a:t>Demo Time!</a:t>
+            <a:r>
+              <a:rPr lang="en-US" dirty="0">
+                <a:latin typeface="Bahnschrift" panose="020B0502040204020203" pitchFamily="34" charset="0"/>
+              </a:rPr>
+              <a:t>Socket Interactor</a:t>
+            </a:r>
+          </a:p>
+        </p:txBody>
+      </p:sp>
+      <p:sp>
+        <p:nvSpPr>
+          <p:cNvPr id="3" name="Content Placeholder 2">
+            <a:extLst>
+              <a:ext uri="{FF2B5EF4-FFF2-40B4-BE49-F238E27FC236}">
+                <a16:creationId xmlns:a16="http://schemas.microsoft.com/office/drawing/2014/main" id="{49FD8C2D-32F9-4E05-B1D6-A27CCD110BEC}"/>
+              </a:ext>
+            </a:extLst>
+          </p:cNvPr>
+          <p:cNvSpPr>
+            <a:spLocks noGrp="1"/>
+          </p:cNvSpPr>
+          <p:nvPr>
+            <p:ph idx="1"/>
+          </p:nvPr>
+        </p:nvSpPr>
+        <p:spPr>
+          <a:xfrm>
+            <a:off x="838199" y="1690688"/>
+            <a:ext cx="10515600" cy="4651923"/>
+          </a:xfrm>
+        </p:spPr>
+        <p:txBody>
+          <a:bodyPr>
+            <a:normAutofit/>
+          </a:bodyPr>
+          <a:lstStyle/>
+          <a:p>
+            <a:r>
+              <a:rPr lang="en-US" sz="2400" dirty="0">
+                <a:latin typeface="Bahnschrift" panose="020B0502040204020203" pitchFamily="34" charset="0"/>
+              </a:rPr>
+              <a:t>Often in VR, we might want objects to snap to a certain position when placed.</a:t>
+            </a:r>
+          </a:p>
+          <a:p>
+            <a:pPr lvl="1"/>
+            <a:r>
+              <a:rPr lang="en-US" sz="2000" dirty="0">
+                <a:latin typeface="Bahnschrift" panose="020B0502040204020203" pitchFamily="34" charset="0"/>
+              </a:rPr>
+              <a:t>E.g. Chairs being pushed neatly into tables, mounting prizes onto walls, putting equipment back, etc.</a:t>
+            </a:r>
+          </a:p>
+          <a:p>
+            <a:endParaRPr lang="en-US" sz="2400" dirty="0">
+              <a:latin typeface="Bahnschrift" panose="020B0502040204020203" pitchFamily="34" charset="0"/>
+            </a:endParaRPr>
+          </a:p>
+          <a:p>
+            <a:r>
+              <a:rPr lang="en-US" sz="2400" dirty="0">
+                <a:latin typeface="Bahnschrift" panose="020B0502040204020203" pitchFamily="34" charset="0"/>
+              </a:rPr>
+              <a:t>To achieve these </a:t>
+            </a:r>
+            <a:r>
+              <a:rPr lang="en-US" sz="2400" dirty="0" err="1">
+                <a:latin typeface="Bahnschrift" panose="020B0502040204020203" pitchFamily="34" charset="0"/>
+              </a:rPr>
+              <a:t>behaviours</a:t>
+            </a:r>
+            <a:r>
+              <a:rPr lang="en-US" sz="2400" dirty="0">
+                <a:latin typeface="Bahnschrift" panose="020B0502040204020203" pitchFamily="34" charset="0"/>
+              </a:rPr>
+              <a:t>, we can use Socket Interactors from XRTK.</a:t>
             </a:r>
           </a:p>
         </p:txBody>
@@ -6884,7 +6688,7 @@
     </p:spTree>
     <p:extLst>
       <p:ext uri="{BB962C8B-B14F-4D97-AF65-F5344CB8AC3E}">
-        <p14:creationId xmlns:p14="http://schemas.microsoft.com/office/powerpoint/2010/main" val="1808737497"/>
+        <p14:creationId xmlns:p14="http://schemas.microsoft.com/office/powerpoint/2010/main" val="3008074767"/>
       </p:ext>
     </p:extLst>
   </p:cSld>
@@ -6975,139 +6779,6 @@
               <a:rPr lang="en-US" sz="2400" dirty="0">
                 <a:latin typeface="Bahnschrift" panose="020B0502040204020203" pitchFamily="34" charset="0"/>
               </a:rPr>
-              <a:t>Often in VR, we might want objects to snap to a certain position when placed.</a:t>
-            </a:r>
-          </a:p>
-          <a:p>
-            <a:pPr lvl="1"/>
-            <a:r>
-              <a:rPr lang="en-US" sz="2000" dirty="0">
-                <a:latin typeface="Bahnschrift" panose="020B0502040204020203" pitchFamily="34" charset="0"/>
-              </a:rPr>
-              <a:t>E.g. Chairs being pushed neatly into tables, mounting prizes onto walls, putting equipment back, etc.</a:t>
-            </a:r>
-          </a:p>
-          <a:p>
-            <a:endParaRPr lang="en-US" sz="2400" dirty="0">
-              <a:latin typeface="Bahnschrift" panose="020B0502040204020203" pitchFamily="34" charset="0"/>
-            </a:endParaRPr>
-          </a:p>
-          <a:p>
-            <a:r>
-              <a:rPr lang="en-US" sz="2400" dirty="0">
-                <a:latin typeface="Bahnschrift" panose="020B0502040204020203" pitchFamily="34" charset="0"/>
-              </a:rPr>
-              <a:t>To achieve these </a:t>
-            </a:r>
-            <a:r>
-              <a:rPr lang="en-US" sz="2400" dirty="0" err="1">
-                <a:latin typeface="Bahnschrift" panose="020B0502040204020203" pitchFamily="34" charset="0"/>
-              </a:rPr>
-              <a:t>behaviours</a:t>
-            </a:r>
-            <a:r>
-              <a:rPr lang="en-US" sz="2400" dirty="0">
-                <a:latin typeface="Bahnschrift" panose="020B0502040204020203" pitchFamily="34" charset="0"/>
-              </a:rPr>
-              <a:t>, we can use Socket Interactors from XRTK.</a:t>
-            </a:r>
-          </a:p>
-        </p:txBody>
-      </p:sp>
-    </p:spTree>
-    <p:extLst>
-      <p:ext uri="{BB962C8B-B14F-4D97-AF65-F5344CB8AC3E}">
-        <p14:creationId xmlns:p14="http://schemas.microsoft.com/office/powerpoint/2010/main" val="3008074767"/>
-      </p:ext>
-    </p:extLst>
-  </p:cSld>
-  <p:clrMapOvr>
-    <a:masterClrMapping/>
-  </p:clrMapOvr>
-</p:sld>
-</file>
-
-<file path=ppt/slides/slide27.xml><?xml version="1.0" encoding="utf-8"?>
-<p:sld xmlns:a="http://schemas.openxmlformats.org/drawingml/2006/main" xmlns:r="http://schemas.openxmlformats.org/officeDocument/2006/relationships" xmlns:p="http://schemas.openxmlformats.org/presentationml/2006/main">
-  <p:cSld>
-    <p:spTree>
-      <p:nvGrpSpPr>
-        <p:cNvPr id="1" name=""/>
-        <p:cNvGrpSpPr/>
-        <p:nvPr/>
-      </p:nvGrpSpPr>
-      <p:grpSpPr>
-        <a:xfrm>
-          <a:off x="0" y="0"/>
-          <a:ext cx="0" cy="0"/>
-          <a:chOff x="0" y="0"/>
-          <a:chExt cx="0" cy="0"/>
-        </a:xfrm>
-      </p:grpSpPr>
-      <p:sp>
-        <p:nvSpPr>
-          <p:cNvPr id="2" name="Title 1">
-            <a:extLst>
-              <a:ext uri="{FF2B5EF4-FFF2-40B4-BE49-F238E27FC236}">
-                <a16:creationId xmlns:a16="http://schemas.microsoft.com/office/drawing/2014/main" id="{264E5970-3812-4B23-BF67-26CB2C14C1EB}"/>
-              </a:ext>
-            </a:extLst>
-          </p:cNvPr>
-          <p:cNvSpPr>
-            <a:spLocks noGrp="1"/>
-          </p:cNvSpPr>
-          <p:nvPr>
-            <p:ph type="title"/>
-          </p:nvPr>
-        </p:nvSpPr>
-        <p:spPr/>
-        <p:txBody>
-          <a:bodyPr>
-            <a:normAutofit/>
-          </a:bodyPr>
-          <a:lstStyle/>
-          <a:p>
-            <a:r>
-              <a:rPr lang="en-US" dirty="0">
-                <a:latin typeface="Bahnschrift" panose="020B0502040204020203" pitchFamily="34" charset="0"/>
-              </a:rPr>
-              <a:t>Socket Interactor</a:t>
-            </a:r>
-          </a:p>
-        </p:txBody>
-      </p:sp>
-      <p:sp>
-        <p:nvSpPr>
-          <p:cNvPr id="3" name="Content Placeholder 2">
-            <a:extLst>
-              <a:ext uri="{FF2B5EF4-FFF2-40B4-BE49-F238E27FC236}">
-                <a16:creationId xmlns:a16="http://schemas.microsoft.com/office/drawing/2014/main" id="{49FD8C2D-32F9-4E05-B1D6-A27CCD110BEC}"/>
-              </a:ext>
-            </a:extLst>
-          </p:cNvPr>
-          <p:cNvSpPr>
-            <a:spLocks noGrp="1"/>
-          </p:cNvSpPr>
-          <p:nvPr>
-            <p:ph idx="1"/>
-          </p:nvPr>
-        </p:nvSpPr>
-        <p:spPr>
-          <a:xfrm>
-            <a:off x="838199" y="1690688"/>
-            <a:ext cx="10515600" cy="4651923"/>
-          </a:xfrm>
-        </p:spPr>
-        <p:txBody>
-          <a:bodyPr>
-            <a:normAutofit/>
-          </a:bodyPr>
-          <a:lstStyle/>
-          <a:p>
-            <a:r>
-              <a:rPr lang="en-US" sz="2400" dirty="0">
-                <a:latin typeface="Bahnschrift" panose="020B0502040204020203" pitchFamily="34" charset="0"/>
-              </a:rPr>
               <a:t>When added to an object, a Socket Interactor component will look for any </a:t>
             </a:r>
             <a:r>
@@ -7163,7 +6834,7 @@
 </p:sld>
 </file>
 
-<file path=ppt/slides/slide28.xml><?xml version="1.0" encoding="utf-8"?>
+<file path=ppt/slides/slide27.xml><?xml version="1.0" encoding="utf-8"?>
 <p:sld xmlns:a="http://schemas.openxmlformats.org/drawingml/2006/main" xmlns:r="http://schemas.openxmlformats.org/officeDocument/2006/relationships" xmlns:p="http://schemas.openxmlformats.org/presentationml/2006/main">
   <p:cSld>
     <p:spTree>
@@ -7357,7 +7028,7 @@
 </p:sld>
 </file>
 
-<file path=ppt/slides/slide29.xml><?xml version="1.0" encoding="utf-8"?>
+<file path=ppt/slides/slide28.xml><?xml version="1.0" encoding="utf-8"?>
 <p:sld xmlns:a="http://schemas.openxmlformats.org/drawingml/2006/main" xmlns:r="http://schemas.openxmlformats.org/officeDocument/2006/relationships" xmlns:p="http://schemas.openxmlformats.org/presentationml/2006/main">
   <p:cSld>
     <p:spTree>
@@ -7579,156 +7250,7 @@
 </p:sld>
 </file>
 
-<file path=ppt/slides/slide3.xml><?xml version="1.0" encoding="utf-8"?>
-<p:sld xmlns:a="http://schemas.openxmlformats.org/drawingml/2006/main" xmlns:r="http://schemas.openxmlformats.org/officeDocument/2006/relationships" xmlns:p="http://schemas.openxmlformats.org/presentationml/2006/main">
-  <p:cSld>
-    <p:spTree>
-      <p:nvGrpSpPr>
-        <p:cNvPr id="1" name=""/>
-        <p:cNvGrpSpPr/>
-        <p:nvPr/>
-      </p:nvGrpSpPr>
-      <p:grpSpPr>
-        <a:xfrm>
-          <a:off x="0" y="0"/>
-          <a:ext cx="0" cy="0"/>
-          <a:chOff x="0" y="0"/>
-          <a:chExt cx="0" cy="0"/>
-        </a:xfrm>
-      </p:grpSpPr>
-      <p:sp>
-        <p:nvSpPr>
-          <p:cNvPr id="2" name="Title 1">
-            <a:extLst>
-              <a:ext uri="{FF2B5EF4-FFF2-40B4-BE49-F238E27FC236}">
-                <a16:creationId xmlns:a16="http://schemas.microsoft.com/office/drawing/2014/main" id="{264E5970-3812-4B23-BF67-26CB2C14C1EB}"/>
-              </a:ext>
-            </a:extLst>
-          </p:cNvPr>
-          <p:cNvSpPr>
-            <a:spLocks noGrp="1"/>
-          </p:cNvSpPr>
-          <p:nvPr>
-            <p:ph type="title"/>
-          </p:nvPr>
-        </p:nvSpPr>
-        <p:spPr/>
-        <p:txBody>
-          <a:bodyPr>
-            <a:normAutofit/>
-          </a:bodyPr>
-          <a:lstStyle/>
-          <a:p>
-            <a:r>
-              <a:rPr lang="en-US" dirty="0">
-                <a:latin typeface="Bahnschrift" panose="020B0502040204020203" pitchFamily="34" charset="0"/>
-              </a:rPr>
-              <a:t>Recap</a:t>
-            </a:r>
-          </a:p>
-        </p:txBody>
-      </p:sp>
-      <p:sp>
-        <p:nvSpPr>
-          <p:cNvPr id="3" name="Content Placeholder 2">
-            <a:extLst>
-              <a:ext uri="{FF2B5EF4-FFF2-40B4-BE49-F238E27FC236}">
-                <a16:creationId xmlns:a16="http://schemas.microsoft.com/office/drawing/2014/main" id="{49FD8C2D-32F9-4E05-B1D6-A27CCD110BEC}"/>
-              </a:ext>
-            </a:extLst>
-          </p:cNvPr>
-          <p:cNvSpPr>
-            <a:spLocks noGrp="1"/>
-          </p:cNvSpPr>
-          <p:nvPr>
-            <p:ph idx="1"/>
-          </p:nvPr>
-        </p:nvSpPr>
-        <p:spPr>
-          <a:xfrm>
-            <a:off x="838200" y="1690689"/>
-            <a:ext cx="10515600" cy="4486274"/>
-          </a:xfrm>
-        </p:spPr>
-        <p:txBody>
-          <a:bodyPr>
-            <a:normAutofit/>
-          </a:bodyPr>
-          <a:lstStyle/>
-          <a:p>
-            <a:r>
-              <a:rPr lang="en-US" sz="2400" dirty="0">
-                <a:latin typeface="Bahnschrift" panose="020B0502040204020203" pitchFamily="34" charset="0"/>
-              </a:rPr>
-              <a:t>Last week, we talked about how the XRTK package gives us access to its Interactor and Interactable system.</a:t>
-            </a:r>
-          </a:p>
-          <a:p>
-            <a:pPr lvl="1"/>
-            <a:r>
-              <a:rPr lang="en-US" sz="2000" dirty="0">
-                <a:latin typeface="Bahnschrift" panose="020B0502040204020203" pitchFamily="34" charset="0"/>
-              </a:rPr>
-              <a:t>Interactors are the VR controllers used by the player.</a:t>
-            </a:r>
-          </a:p>
-          <a:p>
-            <a:pPr lvl="1"/>
-            <a:r>
-              <a:rPr lang="en-US" sz="2000" dirty="0" err="1">
-                <a:latin typeface="Bahnschrift" panose="020B0502040204020203" pitchFamily="34" charset="0"/>
-              </a:rPr>
-              <a:t>Interactables</a:t>
-            </a:r>
-            <a:r>
-              <a:rPr lang="en-US" sz="2000" dirty="0">
-                <a:latin typeface="Bahnschrift" panose="020B0502040204020203" pitchFamily="34" charset="0"/>
-              </a:rPr>
-              <a:t> are the objects that Interactors can act on.</a:t>
-            </a:r>
-          </a:p>
-          <a:p>
-            <a:endParaRPr lang="en-US" sz="2400" dirty="0">
-              <a:latin typeface="Bahnschrift" panose="020B0502040204020203" pitchFamily="34" charset="0"/>
-            </a:endParaRPr>
-          </a:p>
-          <a:p>
-            <a:r>
-              <a:rPr lang="en-US" sz="2400" dirty="0">
-                <a:latin typeface="Bahnschrift" panose="020B0502040204020203" pitchFamily="34" charset="0"/>
-              </a:rPr>
-              <a:t>Using that system, we looked at how we could quickly create a grabbing interaction.</a:t>
-            </a:r>
-          </a:p>
-          <a:p>
-            <a:endParaRPr lang="en-US" sz="2400" dirty="0">
-              <a:latin typeface="Bahnschrift" panose="020B0502040204020203" pitchFamily="34" charset="0"/>
-            </a:endParaRPr>
-          </a:p>
-          <a:p>
-            <a:r>
-              <a:rPr lang="en-US" sz="2400" dirty="0">
-                <a:latin typeface="Bahnschrift" panose="020B0502040204020203" pitchFamily="34" charset="0"/>
-              </a:rPr>
-              <a:t>Today, we will look at how we can implement other interactions as well.</a:t>
-            </a:r>
-          </a:p>
-        </p:txBody>
-      </p:sp>
-    </p:spTree>
-    <p:extLst>
-      <p:ext uri="{BB962C8B-B14F-4D97-AF65-F5344CB8AC3E}">
-        <p14:creationId xmlns:p14="http://schemas.microsoft.com/office/powerpoint/2010/main" val="1632692131"/>
-      </p:ext>
-    </p:extLst>
-  </p:cSld>
-  <p:clrMapOvr>
-    <a:masterClrMapping/>
-  </p:clrMapOvr>
-</p:sld>
-</file>
-
-<file path=ppt/slides/slide30.xml><?xml version="1.0" encoding="utf-8"?>
+<file path=ppt/slides/slide29.xml><?xml version="1.0" encoding="utf-8"?>
 <p:sld xmlns:a="http://schemas.openxmlformats.org/drawingml/2006/main" xmlns:r="http://schemas.openxmlformats.org/officeDocument/2006/relationships" xmlns:p="http://schemas.openxmlformats.org/presentationml/2006/main">
   <p:cSld>
     <p:spTree>
@@ -7892,6 +7414,202 @@
 </p:sld>
 </file>
 
+<file path=ppt/slides/slide3.xml><?xml version="1.0" encoding="utf-8"?>
+<p:sld xmlns:a="http://schemas.openxmlformats.org/drawingml/2006/main" xmlns:r="http://schemas.openxmlformats.org/officeDocument/2006/relationships" xmlns:p="http://schemas.openxmlformats.org/presentationml/2006/main">
+  <p:cSld>
+    <p:spTree>
+      <p:nvGrpSpPr>
+        <p:cNvPr id="1" name=""/>
+        <p:cNvGrpSpPr/>
+        <p:nvPr/>
+      </p:nvGrpSpPr>
+      <p:grpSpPr>
+        <a:xfrm>
+          <a:off x="0" y="0"/>
+          <a:ext cx="0" cy="0"/>
+          <a:chOff x="0" y="0"/>
+          <a:chExt cx="0" cy="0"/>
+        </a:xfrm>
+      </p:grpSpPr>
+      <p:sp>
+        <p:nvSpPr>
+          <p:cNvPr id="2" name="Title 1">
+            <a:extLst>
+              <a:ext uri="{FF2B5EF4-FFF2-40B4-BE49-F238E27FC236}">
+                <a16:creationId xmlns:a16="http://schemas.microsoft.com/office/drawing/2014/main" id="{264E5970-3812-4B23-BF67-26CB2C14C1EB}"/>
+              </a:ext>
+            </a:extLst>
+          </p:cNvPr>
+          <p:cNvSpPr>
+            <a:spLocks noGrp="1"/>
+          </p:cNvSpPr>
+          <p:nvPr>
+            <p:ph type="title"/>
+          </p:nvPr>
+        </p:nvSpPr>
+        <p:spPr/>
+        <p:txBody>
+          <a:bodyPr>
+            <a:normAutofit/>
+          </a:bodyPr>
+          <a:lstStyle/>
+          <a:p>
+            <a:r>
+              <a:rPr lang="en-US" dirty="0">
+                <a:latin typeface="Bahnschrift" panose="020B0502040204020203" pitchFamily="34" charset="0"/>
+              </a:rPr>
+              <a:t>Lesson Objectives</a:t>
+            </a:r>
+          </a:p>
+        </p:txBody>
+      </p:sp>
+      <p:sp>
+        <p:nvSpPr>
+          <p:cNvPr id="3" name="Content Placeholder 2">
+            <a:extLst>
+              <a:ext uri="{FF2B5EF4-FFF2-40B4-BE49-F238E27FC236}">
+                <a16:creationId xmlns:a16="http://schemas.microsoft.com/office/drawing/2014/main" id="{49FD8C2D-32F9-4E05-B1D6-A27CCD110BEC}"/>
+              </a:ext>
+            </a:extLst>
+          </p:cNvPr>
+          <p:cNvSpPr>
+            <a:spLocks noGrp="1"/>
+          </p:cNvSpPr>
+          <p:nvPr>
+            <p:ph idx="1"/>
+          </p:nvPr>
+        </p:nvSpPr>
+        <p:spPr>
+          <a:xfrm>
+            <a:off x="838200" y="1690689"/>
+            <a:ext cx="10515600" cy="4486274"/>
+          </a:xfrm>
+        </p:spPr>
+        <p:txBody>
+          <a:bodyPr>
+            <a:normAutofit/>
+          </a:bodyPr>
+          <a:lstStyle/>
+          <a:p>
+            <a:r>
+              <a:rPr lang="en-US" sz="2400" dirty="0">
+                <a:latin typeface="Bahnschrift" panose="020B0502040204020203" pitchFamily="34" charset="0"/>
+              </a:rPr>
+              <a:t>Implement Direct Interactors instead of Ray Interactors.</a:t>
+            </a:r>
+          </a:p>
+          <a:p>
+            <a:endParaRPr lang="en-US" sz="2400" dirty="0">
+              <a:latin typeface="Bahnschrift" panose="020B0502040204020203" pitchFamily="34" charset="0"/>
+            </a:endParaRPr>
+          </a:p>
+          <a:p>
+            <a:r>
+              <a:rPr lang="en-US" sz="2400" dirty="0">
+                <a:latin typeface="Bahnschrift" panose="020B0502040204020203" pitchFamily="34" charset="0"/>
+              </a:rPr>
+              <a:t>Create different interactions using the Events system of Interactable objects.</a:t>
+            </a:r>
+          </a:p>
+          <a:p>
+            <a:endParaRPr lang="en-US" sz="2400" dirty="0">
+              <a:latin typeface="Bahnschrift" panose="020B0502040204020203" pitchFamily="34" charset="0"/>
+            </a:endParaRPr>
+          </a:p>
+          <a:p>
+            <a:r>
+              <a:rPr lang="en-US" sz="2400" dirty="0">
+                <a:latin typeface="Bahnschrift" panose="020B0502040204020203" pitchFamily="34" charset="0"/>
+              </a:rPr>
+              <a:t>Use Socket Interactors to create snapping interactions.</a:t>
+            </a:r>
+          </a:p>
+        </p:txBody>
+      </p:sp>
+    </p:spTree>
+    <p:extLst>
+      <p:ext uri="{BB962C8B-B14F-4D97-AF65-F5344CB8AC3E}">
+        <p14:creationId xmlns:p14="http://schemas.microsoft.com/office/powerpoint/2010/main" val="1236732898"/>
+      </p:ext>
+    </p:extLst>
+  </p:cSld>
+  <p:clrMapOvr>
+    <a:masterClrMapping/>
+  </p:clrMapOvr>
+</p:sld>
+</file>
+
+<file path=ppt/slides/slide30.xml><?xml version="1.0" encoding="utf-8"?>
+<p:sld xmlns:a="http://schemas.openxmlformats.org/drawingml/2006/main" xmlns:r="http://schemas.openxmlformats.org/officeDocument/2006/relationships" xmlns:p="http://schemas.openxmlformats.org/presentationml/2006/main">
+  <p:cSld>
+    <p:spTree>
+      <p:nvGrpSpPr>
+        <p:cNvPr id="1" name=""/>
+        <p:cNvGrpSpPr/>
+        <p:nvPr/>
+      </p:nvGrpSpPr>
+      <p:grpSpPr>
+        <a:xfrm>
+          <a:off x="0" y="0"/>
+          <a:ext cx="0" cy="0"/>
+          <a:chOff x="0" y="0"/>
+          <a:chExt cx="0" cy="0"/>
+        </a:xfrm>
+      </p:grpSpPr>
+      <p:sp>
+        <p:nvSpPr>
+          <p:cNvPr id="13" name="Title 1">
+            <a:extLst>
+              <a:ext uri="{FF2B5EF4-FFF2-40B4-BE49-F238E27FC236}">
+                <a16:creationId xmlns:a16="http://schemas.microsoft.com/office/drawing/2014/main" id="{AFBCB11E-07F3-48B7-8B47-7E50039C99D4}"/>
+              </a:ext>
+            </a:extLst>
+          </p:cNvPr>
+          <p:cNvSpPr>
+            <a:spLocks noGrp="1"/>
+          </p:cNvSpPr>
+          <p:nvPr>
+            <p:ph type="title"/>
+          </p:nvPr>
+        </p:nvSpPr>
+        <p:spPr>
+          <a:xfrm>
+            <a:off x="838200" y="365125"/>
+            <a:ext cx="10515600" cy="5229340"/>
+          </a:xfrm>
+        </p:spPr>
+        <p:txBody>
+          <a:bodyPr>
+            <a:normAutofit/>
+          </a:bodyPr>
+          <a:lstStyle/>
+          <a:p>
+            <a:pPr algn="ctr"/>
+            <a:r>
+              <a:rPr lang="en-US" sz="8000" dirty="0">
+                <a:solidFill>
+                  <a:srgbClr val="00A79D"/>
+                </a:solidFill>
+                <a:latin typeface="Bahnschrift" panose="020B0502040204020203" pitchFamily="34" charset="0"/>
+              </a:rPr>
+              <a:t>Demo Time!</a:t>
+            </a:r>
+          </a:p>
+        </p:txBody>
+      </p:sp>
+    </p:spTree>
+    <p:extLst>
+      <p:ext uri="{BB962C8B-B14F-4D97-AF65-F5344CB8AC3E}">
+        <p14:creationId xmlns:p14="http://schemas.microsoft.com/office/powerpoint/2010/main" val="2348307090"/>
+      </p:ext>
+    </p:extLst>
+  </p:cSld>
+  <p:clrMapOvr>
+    <a:masterClrMapping/>
+  </p:clrMapOvr>
+</p:sld>
+</file>
+
 <file path=ppt/slides/slide31.xml><?xml version="1.0" encoding="utf-8"?>
 <p:sld xmlns:a="http://schemas.openxmlformats.org/drawingml/2006/main" xmlns:r="http://schemas.openxmlformats.org/officeDocument/2006/relationships" xmlns:p="http://schemas.openxmlformats.org/presentationml/2006/main">
   <p:cSld>
@@ -7911,10 +7629,10 @@
       </p:grpSpPr>
       <p:sp>
         <p:nvSpPr>
-          <p:cNvPr id="13" name="Title 1">
-            <a:extLst>
-              <a:ext uri="{FF2B5EF4-FFF2-40B4-BE49-F238E27FC236}">
-                <a16:creationId xmlns:a16="http://schemas.microsoft.com/office/drawing/2014/main" id="{AFBCB11E-07F3-48B7-8B47-7E50039C99D4}"/>
+          <p:cNvPr id="2" name="Title 1">
+            <a:extLst>
+              <a:ext uri="{FF2B5EF4-FFF2-40B4-BE49-F238E27FC236}">
+                <a16:creationId xmlns:a16="http://schemas.microsoft.com/office/drawing/2014/main" id="{264E5970-3812-4B23-BF67-26CB2C14C1EB}"/>
               </a:ext>
             </a:extLst>
           </p:cNvPr>
@@ -7925,35 +7643,115 @@
             <p:ph type="title"/>
           </p:nvPr>
         </p:nvSpPr>
-        <p:spPr>
-          <a:xfrm>
-            <a:off x="838200" y="365125"/>
-            <a:ext cx="10515600" cy="5229340"/>
-          </a:xfrm>
-        </p:spPr>
+        <p:spPr/>
         <p:txBody>
           <a:bodyPr>
             <a:normAutofit/>
           </a:bodyPr>
           <a:lstStyle/>
           <a:p>
-            <a:pPr algn="ctr"/>
-            <a:r>
-              <a:rPr lang="en-US" sz="8000" dirty="0">
-                <a:solidFill>
-                  <a:srgbClr val="00A79D"/>
-                </a:solidFill>
-                <a:latin typeface="Bahnschrift" panose="020B0502040204020203" pitchFamily="34" charset="0"/>
-              </a:rPr>
-              <a:t>Demo Time!</a:t>
-            </a:r>
+            <a:r>
+              <a:rPr lang="en-US" dirty="0">
+                <a:latin typeface="Bahnschrift" panose="020B0502040204020203" pitchFamily="34" charset="0"/>
+              </a:rPr>
+              <a:t>Summary</a:t>
+            </a:r>
+          </a:p>
+        </p:txBody>
+      </p:sp>
+      <p:sp>
+        <p:nvSpPr>
+          <p:cNvPr id="12" name="Content Placeholder 2">
+            <a:extLst>
+              <a:ext uri="{FF2B5EF4-FFF2-40B4-BE49-F238E27FC236}">
+                <a16:creationId xmlns:a16="http://schemas.microsoft.com/office/drawing/2014/main" id="{6F36D6E1-16B7-427F-89CC-C213C8C6871E}"/>
+              </a:ext>
+            </a:extLst>
+          </p:cNvPr>
+          <p:cNvSpPr>
+            <a:spLocks noGrp="1"/>
+          </p:cNvSpPr>
+          <p:nvPr>
+            <p:ph idx="1"/>
+          </p:nvPr>
+        </p:nvSpPr>
+        <p:spPr>
+          <a:xfrm>
+            <a:off x="838200" y="1690689"/>
+            <a:ext cx="10515600" cy="4486274"/>
+          </a:xfrm>
+        </p:spPr>
+        <p:txBody>
+          <a:bodyPr>
+            <a:normAutofit/>
+          </a:bodyPr>
+          <a:lstStyle/>
+          <a:p>
+            <a:r>
+              <a:rPr lang="en-US" sz="2400" dirty="0">
+                <a:latin typeface="Bahnschrift" panose="020B0502040204020203" pitchFamily="34" charset="0"/>
+              </a:rPr>
+              <a:t>To simulate reality, we might want to use Direct Interactors as they require our users to ‘physically’ touch the objects they want to interact with.</a:t>
+            </a:r>
+          </a:p>
+          <a:p>
+            <a:endParaRPr lang="en-US" sz="2400" dirty="0">
+              <a:latin typeface="Bahnschrift" panose="020B0502040204020203" pitchFamily="34" charset="0"/>
+            </a:endParaRPr>
+          </a:p>
+          <a:p>
+            <a:r>
+              <a:rPr lang="en-US" sz="2400" dirty="0">
+                <a:latin typeface="Bahnschrift" panose="020B0502040204020203" pitchFamily="34" charset="0"/>
+              </a:rPr>
+              <a:t>Using Events in Interactable components, we can link our code to VR interactions and create custom </a:t>
+            </a:r>
+            <a:r>
+              <a:rPr lang="en-US" sz="2400" dirty="0" err="1">
+                <a:latin typeface="Bahnschrift" panose="020B0502040204020203" pitchFamily="34" charset="0"/>
+              </a:rPr>
+              <a:t>behaviours</a:t>
+            </a:r>
+            <a:r>
+              <a:rPr lang="en-US" sz="2400" dirty="0">
+                <a:latin typeface="Bahnschrift" panose="020B0502040204020203" pitchFamily="34" charset="0"/>
+              </a:rPr>
+              <a:t>.</a:t>
+            </a:r>
+          </a:p>
+          <a:p>
+            <a:endParaRPr lang="en-US" sz="2400" dirty="0">
+              <a:latin typeface="Bahnschrift" panose="020B0502040204020203" pitchFamily="34" charset="0"/>
+            </a:endParaRPr>
+          </a:p>
+          <a:p>
+            <a:r>
+              <a:rPr lang="en-US" sz="2400" dirty="0">
+                <a:latin typeface="Bahnschrift" panose="020B0502040204020203" pitchFamily="34" charset="0"/>
+              </a:rPr>
+              <a:t>Socket Interactors give us the ability to create snapping points that our objects will snap to </a:t>
+            </a:r>
+            <a:r>
+              <a:rPr lang="en-US" sz="2400">
+                <a:latin typeface="Bahnschrift" panose="020B0502040204020203" pitchFamily="34" charset="0"/>
+              </a:rPr>
+              <a:t>when released.</a:t>
+            </a:r>
+            <a:endParaRPr lang="en-US" sz="2400" dirty="0">
+              <a:latin typeface="Bahnschrift" panose="020B0502040204020203" pitchFamily="34" charset="0"/>
+            </a:endParaRPr>
+          </a:p>
+          <a:p>
+            <a:endParaRPr lang="en-US" sz="2000" dirty="0">
+              <a:latin typeface="Bahnschrift" panose="020B0502040204020203" pitchFamily="34" charset="0"/>
+            </a:endParaRPr>
           </a:p>
         </p:txBody>
       </p:sp>
     </p:spTree>
     <p:extLst>
       <p:ext uri="{BB962C8B-B14F-4D97-AF65-F5344CB8AC3E}">
-        <p14:creationId xmlns:p14="http://schemas.microsoft.com/office/powerpoint/2010/main" val="2348307090"/>
+        <p14:creationId xmlns:p14="http://schemas.microsoft.com/office/powerpoint/2010/main" val="1788735058"/>
       </p:ext>
     </p:extLst>
   </p:cSld>
@@ -8007,157 +7805,6 @@
               <a:rPr lang="en-US" dirty="0">
                 <a:latin typeface="Bahnschrift" panose="020B0502040204020203" pitchFamily="34" charset="0"/>
               </a:rPr>
-              <a:t>Summary</a:t>
-            </a:r>
-          </a:p>
-        </p:txBody>
-      </p:sp>
-      <p:sp>
-        <p:nvSpPr>
-          <p:cNvPr id="12" name="Content Placeholder 2">
-            <a:extLst>
-              <a:ext uri="{FF2B5EF4-FFF2-40B4-BE49-F238E27FC236}">
-                <a16:creationId xmlns:a16="http://schemas.microsoft.com/office/drawing/2014/main" id="{6F36D6E1-16B7-427F-89CC-C213C8C6871E}"/>
-              </a:ext>
-            </a:extLst>
-          </p:cNvPr>
-          <p:cNvSpPr>
-            <a:spLocks noGrp="1"/>
-          </p:cNvSpPr>
-          <p:nvPr>
-            <p:ph idx="1"/>
-          </p:nvPr>
-        </p:nvSpPr>
-        <p:spPr>
-          <a:xfrm>
-            <a:off x="838200" y="1690689"/>
-            <a:ext cx="10515600" cy="4486274"/>
-          </a:xfrm>
-        </p:spPr>
-        <p:txBody>
-          <a:bodyPr>
-            <a:normAutofit/>
-          </a:bodyPr>
-          <a:lstStyle/>
-          <a:p>
-            <a:r>
-              <a:rPr lang="en-US" sz="2400" dirty="0">
-                <a:latin typeface="Bahnschrift" panose="020B0502040204020203" pitchFamily="34" charset="0"/>
-              </a:rPr>
-              <a:t>To simulate reality, we might want to use Direct Interactors as they require our users to ‘physically’ touch the objects they want to interact with.</a:t>
-            </a:r>
-          </a:p>
-          <a:p>
-            <a:endParaRPr lang="en-US" sz="2400" dirty="0">
-              <a:latin typeface="Bahnschrift" panose="020B0502040204020203" pitchFamily="34" charset="0"/>
-            </a:endParaRPr>
-          </a:p>
-          <a:p>
-            <a:r>
-              <a:rPr lang="en-US" sz="2400" dirty="0">
-                <a:latin typeface="Bahnschrift" panose="020B0502040204020203" pitchFamily="34" charset="0"/>
-              </a:rPr>
-              <a:t>Using Events in Interactable components, we can link our code to VR interactions and create custom </a:t>
-            </a:r>
-            <a:r>
-              <a:rPr lang="en-US" sz="2400" dirty="0" err="1">
-                <a:latin typeface="Bahnschrift" panose="020B0502040204020203" pitchFamily="34" charset="0"/>
-              </a:rPr>
-              <a:t>behaviours</a:t>
-            </a:r>
-            <a:r>
-              <a:rPr lang="en-US" sz="2400" dirty="0">
-                <a:latin typeface="Bahnschrift" panose="020B0502040204020203" pitchFamily="34" charset="0"/>
-              </a:rPr>
-              <a:t>.</a:t>
-            </a:r>
-          </a:p>
-          <a:p>
-            <a:endParaRPr lang="en-US" sz="2400" dirty="0">
-              <a:latin typeface="Bahnschrift" panose="020B0502040204020203" pitchFamily="34" charset="0"/>
-            </a:endParaRPr>
-          </a:p>
-          <a:p>
-            <a:r>
-              <a:rPr lang="en-US" sz="2400" dirty="0">
-                <a:latin typeface="Bahnschrift" panose="020B0502040204020203" pitchFamily="34" charset="0"/>
-              </a:rPr>
-              <a:t>Socket Interactors give us the ability to create snapping points that our objects will snap to </a:t>
-            </a:r>
-            <a:r>
-              <a:rPr lang="en-US" sz="2400">
-                <a:latin typeface="Bahnschrift" panose="020B0502040204020203" pitchFamily="34" charset="0"/>
-              </a:rPr>
-              <a:t>when released.</a:t>
-            </a:r>
-            <a:endParaRPr lang="en-US" sz="2400" dirty="0">
-              <a:latin typeface="Bahnschrift" panose="020B0502040204020203" pitchFamily="34" charset="0"/>
-            </a:endParaRPr>
-          </a:p>
-          <a:p>
-            <a:endParaRPr lang="en-US" sz="2000" dirty="0">
-              <a:latin typeface="Bahnschrift" panose="020B0502040204020203" pitchFamily="34" charset="0"/>
-            </a:endParaRPr>
-          </a:p>
-        </p:txBody>
-      </p:sp>
-    </p:spTree>
-    <p:extLst>
-      <p:ext uri="{BB962C8B-B14F-4D97-AF65-F5344CB8AC3E}">
-        <p14:creationId xmlns:p14="http://schemas.microsoft.com/office/powerpoint/2010/main" val="1788735058"/>
-      </p:ext>
-    </p:extLst>
-  </p:cSld>
-  <p:clrMapOvr>
-    <a:masterClrMapping/>
-  </p:clrMapOvr>
-</p:sld>
-</file>
-
-<file path=ppt/slides/slide33.xml><?xml version="1.0" encoding="utf-8"?>
-<p:sld xmlns:a="http://schemas.openxmlformats.org/drawingml/2006/main" xmlns:r="http://schemas.openxmlformats.org/officeDocument/2006/relationships" xmlns:p="http://schemas.openxmlformats.org/presentationml/2006/main">
-  <p:cSld>
-    <p:spTree>
-      <p:nvGrpSpPr>
-        <p:cNvPr id="1" name=""/>
-        <p:cNvGrpSpPr/>
-        <p:nvPr/>
-      </p:nvGrpSpPr>
-      <p:grpSpPr>
-        <a:xfrm>
-          <a:off x="0" y="0"/>
-          <a:ext cx="0" cy="0"/>
-          <a:chOff x="0" y="0"/>
-          <a:chExt cx="0" cy="0"/>
-        </a:xfrm>
-      </p:grpSpPr>
-      <p:sp>
-        <p:nvSpPr>
-          <p:cNvPr id="2" name="Title 1">
-            <a:extLst>
-              <a:ext uri="{FF2B5EF4-FFF2-40B4-BE49-F238E27FC236}">
-                <a16:creationId xmlns:a16="http://schemas.microsoft.com/office/drawing/2014/main" id="{264E5970-3812-4B23-BF67-26CB2C14C1EB}"/>
-              </a:ext>
-            </a:extLst>
-          </p:cNvPr>
-          <p:cNvSpPr>
-            <a:spLocks noGrp="1"/>
-          </p:cNvSpPr>
-          <p:nvPr>
-            <p:ph type="title"/>
-          </p:nvPr>
-        </p:nvSpPr>
-        <p:spPr/>
-        <p:txBody>
-          <a:bodyPr>
-            <a:normAutofit/>
-          </a:bodyPr>
-          <a:lstStyle/>
-          <a:p>
-            <a:r>
-              <a:rPr lang="en-US" dirty="0">
-                <a:latin typeface="Bahnschrift" panose="020B0502040204020203" pitchFamily="34" charset="0"/>
-              </a:rPr>
               <a:t>CA2 (Individual)</a:t>
             </a:r>
           </a:p>
@@ -8263,131 +7910,6 @@
 </file>
 
 <file path=ppt/slides/slide4.xml><?xml version="1.0" encoding="utf-8"?>
-<p:sld xmlns:a="http://schemas.openxmlformats.org/drawingml/2006/main" xmlns:r="http://schemas.openxmlformats.org/officeDocument/2006/relationships" xmlns:p="http://schemas.openxmlformats.org/presentationml/2006/main">
-  <p:cSld>
-    <p:spTree>
-      <p:nvGrpSpPr>
-        <p:cNvPr id="1" name=""/>
-        <p:cNvGrpSpPr/>
-        <p:nvPr/>
-      </p:nvGrpSpPr>
-      <p:grpSpPr>
-        <a:xfrm>
-          <a:off x="0" y="0"/>
-          <a:ext cx="0" cy="0"/>
-          <a:chOff x="0" y="0"/>
-          <a:chExt cx="0" cy="0"/>
-        </a:xfrm>
-      </p:grpSpPr>
-      <p:sp>
-        <p:nvSpPr>
-          <p:cNvPr id="2" name="Title 1">
-            <a:extLst>
-              <a:ext uri="{FF2B5EF4-FFF2-40B4-BE49-F238E27FC236}">
-                <a16:creationId xmlns:a16="http://schemas.microsoft.com/office/drawing/2014/main" id="{264E5970-3812-4B23-BF67-26CB2C14C1EB}"/>
-              </a:ext>
-            </a:extLst>
-          </p:cNvPr>
-          <p:cNvSpPr>
-            <a:spLocks noGrp="1"/>
-          </p:cNvSpPr>
-          <p:nvPr>
-            <p:ph type="title"/>
-          </p:nvPr>
-        </p:nvSpPr>
-        <p:spPr/>
-        <p:txBody>
-          <a:bodyPr>
-            <a:normAutofit/>
-          </a:bodyPr>
-          <a:lstStyle/>
-          <a:p>
-            <a:r>
-              <a:rPr lang="en-US" dirty="0">
-                <a:latin typeface="Bahnschrift" panose="020B0502040204020203" pitchFamily="34" charset="0"/>
-              </a:rPr>
-              <a:t>Lesson Objectives</a:t>
-            </a:r>
-          </a:p>
-        </p:txBody>
-      </p:sp>
-      <p:sp>
-        <p:nvSpPr>
-          <p:cNvPr id="3" name="Content Placeholder 2">
-            <a:extLst>
-              <a:ext uri="{FF2B5EF4-FFF2-40B4-BE49-F238E27FC236}">
-                <a16:creationId xmlns:a16="http://schemas.microsoft.com/office/drawing/2014/main" id="{49FD8C2D-32F9-4E05-B1D6-A27CCD110BEC}"/>
-              </a:ext>
-            </a:extLst>
-          </p:cNvPr>
-          <p:cNvSpPr>
-            <a:spLocks noGrp="1"/>
-          </p:cNvSpPr>
-          <p:nvPr>
-            <p:ph idx="1"/>
-          </p:nvPr>
-        </p:nvSpPr>
-        <p:spPr>
-          <a:xfrm>
-            <a:off x="838200" y="1690689"/>
-            <a:ext cx="10515600" cy="4486274"/>
-          </a:xfrm>
-        </p:spPr>
-        <p:txBody>
-          <a:bodyPr>
-            <a:normAutofit/>
-          </a:bodyPr>
-          <a:lstStyle/>
-          <a:p>
-            <a:r>
-              <a:rPr lang="en-US" sz="2400" dirty="0">
-                <a:latin typeface="Bahnschrift" panose="020B0502040204020203" pitchFamily="34" charset="0"/>
-              </a:rPr>
-              <a:t>Implement Direct Interactors instead of Ray Interactors.</a:t>
-            </a:r>
-          </a:p>
-          <a:p>
-            <a:endParaRPr lang="en-US" sz="2400" dirty="0">
-              <a:latin typeface="Bahnschrift" panose="020B0502040204020203" pitchFamily="34" charset="0"/>
-            </a:endParaRPr>
-          </a:p>
-          <a:p>
-            <a:r>
-              <a:rPr lang="en-US" sz="2400" dirty="0">
-                <a:latin typeface="Bahnschrift" panose="020B0502040204020203" pitchFamily="34" charset="0"/>
-              </a:rPr>
-              <a:t>Create different interactions using the Events system of Interactable objects.</a:t>
-            </a:r>
-          </a:p>
-          <a:p>
-            <a:endParaRPr lang="en-US" sz="2400" dirty="0">
-              <a:latin typeface="Bahnschrift" panose="020B0502040204020203" pitchFamily="34" charset="0"/>
-            </a:endParaRPr>
-          </a:p>
-          <a:p>
-            <a:r>
-              <a:rPr lang="en-US" sz="2400" dirty="0">
-                <a:latin typeface="Bahnschrift" panose="020B0502040204020203" pitchFamily="34" charset="0"/>
-              </a:rPr>
-              <a:t>Use Socket Interactors to create snapping interactions.</a:t>
-            </a:r>
-          </a:p>
-        </p:txBody>
-      </p:sp>
-    </p:spTree>
-    <p:extLst>
-      <p:ext uri="{BB962C8B-B14F-4D97-AF65-F5344CB8AC3E}">
-        <p14:creationId xmlns:p14="http://schemas.microsoft.com/office/powerpoint/2010/main" val="1236732898"/>
-      </p:ext>
-    </p:extLst>
-  </p:cSld>
-  <p:clrMapOvr>
-    <a:masterClrMapping/>
-  </p:clrMapOvr>
-</p:sld>
-</file>
-
-<file path=ppt/slides/slide5.xml><?xml version="1.0" encoding="utf-8"?>
 <p:sld xmlns:a="http://schemas.openxmlformats.org/drawingml/2006/main" xmlns:r="http://schemas.openxmlformats.org/officeDocument/2006/relationships" xmlns:p="http://schemas.openxmlformats.org/presentationml/2006/main">
   <p:cSld>
     <p:spTree>
@@ -8563,7 +8085,7 @@
 </p:sld>
 </file>
 
-<file path=ppt/slides/slide6.xml><?xml version="1.0" encoding="utf-8"?>
+<file path=ppt/slides/slide5.xml><?xml version="1.0" encoding="utf-8"?>
 <p:sld xmlns:a="http://schemas.openxmlformats.org/drawingml/2006/main" xmlns:r="http://schemas.openxmlformats.org/officeDocument/2006/relationships" xmlns:p="http://schemas.openxmlformats.org/presentationml/2006/main">
   <p:cSld>
     <p:spTree>
@@ -8739,7 +8261,7 @@
 </p:sld>
 </file>
 
-<file path=ppt/slides/slide7.xml><?xml version="1.0" encoding="utf-8"?>
+<file path=ppt/slides/slide6.xml><?xml version="1.0" encoding="utf-8"?>
 <p:sld xmlns:a="http://schemas.openxmlformats.org/drawingml/2006/main" xmlns:r="http://schemas.openxmlformats.org/officeDocument/2006/relationships" xmlns:p="http://schemas.openxmlformats.org/presentationml/2006/main">
   <p:cSld>
     <p:spTree>
@@ -8906,7 +8428,7 @@
 </p:sld>
 </file>
 
-<file path=ppt/slides/slide8.xml><?xml version="1.0" encoding="utf-8"?>
+<file path=ppt/slides/slide7.xml><?xml version="1.0" encoding="utf-8"?>
 <p:sld xmlns:a="http://schemas.openxmlformats.org/drawingml/2006/main" xmlns:r="http://schemas.openxmlformats.org/officeDocument/2006/relationships" xmlns:p="http://schemas.openxmlformats.org/presentationml/2006/main">
   <p:cSld>
     <p:spTree>
@@ -9039,6 +8561,170 @@
     <p:extLst>
       <p:ext uri="{BB962C8B-B14F-4D97-AF65-F5344CB8AC3E}">
         <p14:creationId xmlns:p14="http://schemas.microsoft.com/office/powerpoint/2010/main" val="3203380796"/>
+      </p:ext>
+    </p:extLst>
+  </p:cSld>
+  <p:clrMapOvr>
+    <a:masterClrMapping/>
+  </p:clrMapOvr>
+</p:sld>
+</file>
+
+<file path=ppt/slides/slide8.xml><?xml version="1.0" encoding="utf-8"?>
+<p:sld xmlns:a="http://schemas.openxmlformats.org/drawingml/2006/main" xmlns:r="http://schemas.openxmlformats.org/officeDocument/2006/relationships" xmlns:p="http://schemas.openxmlformats.org/presentationml/2006/main">
+  <p:cSld>
+    <p:spTree>
+      <p:nvGrpSpPr>
+        <p:cNvPr id="1" name=""/>
+        <p:cNvGrpSpPr/>
+        <p:nvPr/>
+      </p:nvGrpSpPr>
+      <p:grpSpPr>
+        <a:xfrm>
+          <a:off x="0" y="0"/>
+          <a:ext cx="0" cy="0"/>
+          <a:chOff x="0" y="0"/>
+          <a:chExt cx="0" cy="0"/>
+        </a:xfrm>
+      </p:grpSpPr>
+      <p:sp>
+        <p:nvSpPr>
+          <p:cNvPr id="2" name="Title 1">
+            <a:extLst>
+              <a:ext uri="{FF2B5EF4-FFF2-40B4-BE49-F238E27FC236}">
+                <a16:creationId xmlns:a16="http://schemas.microsoft.com/office/drawing/2014/main" id="{264E5970-3812-4B23-BF67-26CB2C14C1EB}"/>
+              </a:ext>
+            </a:extLst>
+          </p:cNvPr>
+          <p:cNvSpPr>
+            <a:spLocks noGrp="1"/>
+          </p:cNvSpPr>
+          <p:nvPr>
+            <p:ph type="title"/>
+          </p:nvPr>
+        </p:nvSpPr>
+        <p:spPr/>
+        <p:txBody>
+          <a:bodyPr>
+            <a:normAutofit/>
+          </a:bodyPr>
+          <a:lstStyle/>
+          <a:p>
+            <a:r>
+              <a:rPr lang="en-US" dirty="0">
+                <a:latin typeface="Bahnschrift" panose="020B0502040204020203" pitchFamily="34" charset="0"/>
+              </a:rPr>
+              <a:t>XR Direct Interactor</a:t>
+            </a:r>
+          </a:p>
+        </p:txBody>
+      </p:sp>
+      <p:sp>
+        <p:nvSpPr>
+          <p:cNvPr id="3" name="Content Placeholder 2">
+            <a:extLst>
+              <a:ext uri="{FF2B5EF4-FFF2-40B4-BE49-F238E27FC236}">
+                <a16:creationId xmlns:a16="http://schemas.microsoft.com/office/drawing/2014/main" id="{49FD8C2D-32F9-4E05-B1D6-A27CCD110BEC}"/>
+              </a:ext>
+            </a:extLst>
+          </p:cNvPr>
+          <p:cNvSpPr>
+            <a:spLocks noGrp="1"/>
+          </p:cNvSpPr>
+          <p:nvPr>
+            <p:ph idx="1"/>
+          </p:nvPr>
+        </p:nvSpPr>
+        <p:spPr>
+          <a:xfrm>
+            <a:off x="838200" y="1690688"/>
+            <a:ext cx="6010275" cy="4651923"/>
+          </a:xfrm>
+        </p:spPr>
+        <p:txBody>
+          <a:bodyPr>
+            <a:normAutofit/>
+          </a:bodyPr>
+          <a:lstStyle/>
+          <a:p>
+            <a:r>
+              <a:rPr lang="en-US" sz="2400" dirty="0">
+                <a:latin typeface="Bahnschrift" panose="020B0502040204020203" pitchFamily="34" charset="0"/>
+              </a:rPr>
+              <a:t>Next, select the original Controller object and look at its Inspector Window.</a:t>
+            </a:r>
+          </a:p>
+          <a:p>
+            <a:endParaRPr lang="en-US" sz="2400" dirty="0">
+              <a:latin typeface="Bahnschrift" panose="020B0502040204020203" pitchFamily="34" charset="0"/>
+            </a:endParaRPr>
+          </a:p>
+          <a:p>
+            <a:r>
+              <a:rPr lang="en-US" sz="2400" dirty="0">
+                <a:latin typeface="Bahnschrift" panose="020B0502040204020203" pitchFamily="34" charset="0"/>
+              </a:rPr>
+              <a:t>Look for the ‘XR Controller’ component and click on the meatballs icon on the right.</a:t>
+            </a:r>
+          </a:p>
+          <a:p>
+            <a:endParaRPr lang="en-US" sz="2400" dirty="0">
+              <a:latin typeface="Bahnschrift" panose="020B0502040204020203" pitchFamily="34" charset="0"/>
+            </a:endParaRPr>
+          </a:p>
+          <a:p>
+            <a:r>
+              <a:rPr lang="en-US" sz="2400" dirty="0">
+                <a:latin typeface="Bahnschrift" panose="020B0502040204020203" pitchFamily="34" charset="0"/>
+              </a:rPr>
+              <a:t>Then choose ‘Copy Component’</a:t>
+            </a:r>
+          </a:p>
+          <a:p>
+            <a:pPr lvl="1"/>
+            <a:r>
+              <a:rPr lang="en-US" sz="2000" dirty="0">
+                <a:latin typeface="Bahnschrift" panose="020B0502040204020203" pitchFamily="34" charset="0"/>
+              </a:rPr>
+              <a:t>This step is needed because the newly created Direct Interactor does not have the correct input linked to it.</a:t>
+            </a:r>
+          </a:p>
+        </p:txBody>
+      </p:sp>
+      <p:pic>
+        <p:nvPicPr>
+          <p:cNvPr id="6" name="Picture 5">
+            <a:extLst>
+              <a:ext uri="{FF2B5EF4-FFF2-40B4-BE49-F238E27FC236}">
+                <a16:creationId xmlns:a16="http://schemas.microsoft.com/office/drawing/2014/main" id="{3F1863FB-07A1-4BD0-8A06-120F48433EA6}"/>
+              </a:ext>
+            </a:extLst>
+          </p:cNvPr>
+          <p:cNvPicPr>
+            <a:picLocks noChangeAspect="1"/>
+          </p:cNvPicPr>
+          <p:nvPr/>
+        </p:nvPicPr>
+        <p:blipFill>
+          <a:blip r:embed="rId2"/>
+          <a:stretch>
+            <a:fillRect/>
+          </a:stretch>
+        </p:blipFill>
+        <p:spPr>
+          <a:xfrm>
+            <a:off x="6848475" y="1543050"/>
+            <a:ext cx="5343525" cy="4600575"/>
+          </a:xfrm>
+          <a:prstGeom prst="rect">
+            <a:avLst/>
+          </a:prstGeom>
+        </p:spPr>
+      </p:pic>
+    </p:spTree>
+    <p:extLst>
+      <p:ext uri="{BB962C8B-B14F-4D97-AF65-F5344CB8AC3E}">
+        <p14:creationId xmlns:p14="http://schemas.microsoft.com/office/powerpoint/2010/main" val="2345745521"/>
       </p:ext>
     </p:extLst>
   </p:cSld>
@@ -9065,116 +8751,12 @@
           <a:chExt cx="0" cy="0"/>
         </a:xfrm>
       </p:grpSpPr>
-      <p:sp>
-        <p:nvSpPr>
-          <p:cNvPr id="2" name="Title 1">
-            <a:extLst>
-              <a:ext uri="{FF2B5EF4-FFF2-40B4-BE49-F238E27FC236}">
-                <a16:creationId xmlns:a16="http://schemas.microsoft.com/office/drawing/2014/main" id="{264E5970-3812-4B23-BF67-26CB2C14C1EB}"/>
-              </a:ext>
-            </a:extLst>
-          </p:cNvPr>
-          <p:cNvSpPr>
-            <a:spLocks noGrp="1"/>
-          </p:cNvSpPr>
-          <p:nvPr>
-            <p:ph type="title"/>
-          </p:nvPr>
-        </p:nvSpPr>
-        <p:spPr/>
-        <p:txBody>
-          <a:bodyPr>
-            <a:normAutofit/>
-          </a:bodyPr>
-          <a:lstStyle/>
-          <a:p>
-            <a:r>
-              <a:rPr lang="en-US" dirty="0">
-                <a:latin typeface="Bahnschrift" panose="020B0502040204020203" pitchFamily="34" charset="0"/>
-              </a:rPr>
-              <a:t>XR Direct Interactor</a:t>
-            </a:r>
-          </a:p>
-        </p:txBody>
-      </p:sp>
-      <p:sp>
-        <p:nvSpPr>
-          <p:cNvPr id="3" name="Content Placeholder 2">
-            <a:extLst>
-              <a:ext uri="{FF2B5EF4-FFF2-40B4-BE49-F238E27FC236}">
-                <a16:creationId xmlns:a16="http://schemas.microsoft.com/office/drawing/2014/main" id="{49FD8C2D-32F9-4E05-B1D6-A27CCD110BEC}"/>
-              </a:ext>
-            </a:extLst>
-          </p:cNvPr>
-          <p:cNvSpPr>
-            <a:spLocks noGrp="1"/>
-          </p:cNvSpPr>
-          <p:nvPr>
-            <p:ph idx="1"/>
-          </p:nvPr>
-        </p:nvSpPr>
-        <p:spPr>
-          <a:xfrm>
-            <a:off x="838200" y="1690688"/>
-            <a:ext cx="6010275" cy="4651923"/>
-          </a:xfrm>
-        </p:spPr>
-        <p:txBody>
-          <a:bodyPr>
-            <a:normAutofit/>
-          </a:bodyPr>
-          <a:lstStyle/>
-          <a:p>
-            <a:r>
-              <a:rPr lang="en-US" sz="2400" dirty="0">
-                <a:latin typeface="Bahnschrift" panose="020B0502040204020203" pitchFamily="34" charset="0"/>
-              </a:rPr>
-              <a:t>Next, select the original Controller object and look at its Inspector Window.</a:t>
-            </a:r>
-          </a:p>
-          <a:p>
-            <a:endParaRPr lang="en-US" sz="2400" dirty="0">
-              <a:latin typeface="Bahnschrift" panose="020B0502040204020203" pitchFamily="34" charset="0"/>
-            </a:endParaRPr>
-          </a:p>
-          <a:p>
-            <a:r>
-              <a:rPr lang="en-US" sz="2400" dirty="0">
-                <a:latin typeface="Bahnschrift" panose="020B0502040204020203" pitchFamily="34" charset="0"/>
-              </a:rPr>
-              <a:t>Look for the ‘XR Controller’ component and click on the meatballs icon on the right.</a:t>
-            </a:r>
-          </a:p>
-          <a:p>
-            <a:endParaRPr lang="en-US" sz="2400" dirty="0">
-              <a:latin typeface="Bahnschrift" panose="020B0502040204020203" pitchFamily="34" charset="0"/>
-            </a:endParaRPr>
-          </a:p>
-          <a:p>
-            <a:r>
-              <a:rPr lang="en-US" sz="2400" dirty="0">
-                <a:latin typeface="Bahnschrift" panose="020B0502040204020203" pitchFamily="34" charset="0"/>
-              </a:rPr>
-              <a:t>Then choose ‘Copy Component’</a:t>
-            </a:r>
-          </a:p>
-          <a:p>
-            <a:pPr lvl="1"/>
-            <a:r>
-              <a:rPr lang="en-US" sz="2000" dirty="0">
-                <a:latin typeface="Bahnschrift" panose="020B0502040204020203" pitchFamily="34" charset="0"/>
-              </a:rPr>
-              <a:t>This step is needed because the newly created Direct Interactor does not have the correct input linked to it.</a:t>
-            </a:r>
-          </a:p>
-        </p:txBody>
-      </p:sp>
       <p:pic>
         <p:nvPicPr>
-          <p:cNvPr id="6" name="Picture 5">
-            <a:extLst>
-              <a:ext uri="{FF2B5EF4-FFF2-40B4-BE49-F238E27FC236}">
-                <a16:creationId xmlns:a16="http://schemas.microsoft.com/office/drawing/2014/main" id="{3F1863FB-07A1-4BD0-8A06-120F48433EA6}"/>
+          <p:cNvPr id="5" name="Picture 4">
+            <a:extLst>
+              <a:ext uri="{FF2B5EF4-FFF2-40B4-BE49-F238E27FC236}">
+                <a16:creationId xmlns:a16="http://schemas.microsoft.com/office/drawing/2014/main" id="{304AD8DB-35D2-4B4C-896D-4BB91A5CC073}"/>
               </a:ext>
             </a:extLst>
           </p:cNvPr>
@@ -9191,18 +8773,116 @@
         </p:blipFill>
         <p:spPr>
           <a:xfrm>
-            <a:off x="6848475" y="1543050"/>
-            <a:ext cx="5343525" cy="4600575"/>
+            <a:off x="6843713" y="1543050"/>
+            <a:ext cx="5353050" cy="4610100"/>
           </a:xfrm>
           <a:prstGeom prst="rect">
             <a:avLst/>
           </a:prstGeom>
         </p:spPr>
       </p:pic>
+      <p:sp>
+        <p:nvSpPr>
+          <p:cNvPr id="2" name="Title 1">
+            <a:extLst>
+              <a:ext uri="{FF2B5EF4-FFF2-40B4-BE49-F238E27FC236}">
+                <a16:creationId xmlns:a16="http://schemas.microsoft.com/office/drawing/2014/main" id="{264E5970-3812-4B23-BF67-26CB2C14C1EB}"/>
+              </a:ext>
+            </a:extLst>
+          </p:cNvPr>
+          <p:cNvSpPr>
+            <a:spLocks noGrp="1"/>
+          </p:cNvSpPr>
+          <p:nvPr>
+            <p:ph type="title"/>
+          </p:nvPr>
+        </p:nvSpPr>
+        <p:spPr/>
+        <p:txBody>
+          <a:bodyPr>
+            <a:normAutofit/>
+          </a:bodyPr>
+          <a:lstStyle/>
+          <a:p>
+            <a:r>
+              <a:rPr lang="en-US" dirty="0">
+                <a:latin typeface="Bahnschrift" panose="020B0502040204020203" pitchFamily="34" charset="0"/>
+              </a:rPr>
+              <a:t>XR Direct Interactor</a:t>
+            </a:r>
+          </a:p>
+        </p:txBody>
+      </p:sp>
+      <p:sp>
+        <p:nvSpPr>
+          <p:cNvPr id="3" name="Content Placeholder 2">
+            <a:extLst>
+              <a:ext uri="{FF2B5EF4-FFF2-40B4-BE49-F238E27FC236}">
+                <a16:creationId xmlns:a16="http://schemas.microsoft.com/office/drawing/2014/main" id="{49FD8C2D-32F9-4E05-B1D6-A27CCD110BEC}"/>
+              </a:ext>
+            </a:extLst>
+          </p:cNvPr>
+          <p:cNvSpPr>
+            <a:spLocks noGrp="1"/>
+          </p:cNvSpPr>
+          <p:nvPr>
+            <p:ph idx="1"/>
+          </p:nvPr>
+        </p:nvSpPr>
+        <p:spPr>
+          <a:xfrm>
+            <a:off x="838200" y="1690688"/>
+            <a:ext cx="6010275" cy="4651923"/>
+          </a:xfrm>
+        </p:spPr>
+        <p:txBody>
+          <a:bodyPr>
+            <a:normAutofit/>
+          </a:bodyPr>
+          <a:lstStyle/>
+          <a:p>
+            <a:r>
+              <a:rPr lang="en-US" sz="2400" dirty="0">
+                <a:latin typeface="Bahnschrift" panose="020B0502040204020203" pitchFamily="34" charset="0"/>
+              </a:rPr>
+              <a:t>Now select the new Direct Interactor object and look for the ‘XR Controller’ component there.</a:t>
+            </a:r>
+          </a:p>
+          <a:p>
+            <a:endParaRPr lang="en-US" sz="2400" dirty="0">
+              <a:latin typeface="Bahnschrift" panose="020B0502040204020203" pitchFamily="34" charset="0"/>
+            </a:endParaRPr>
+          </a:p>
+          <a:p>
+            <a:r>
+              <a:rPr lang="en-US" sz="2400" dirty="0">
+                <a:latin typeface="Bahnschrift" panose="020B0502040204020203" pitchFamily="34" charset="0"/>
+              </a:rPr>
+              <a:t>Click on the meatballs icon and select ‘Paste Component Values’.</a:t>
+            </a:r>
+          </a:p>
+          <a:p>
+            <a:endParaRPr lang="en-US" sz="2400" dirty="0">
+              <a:latin typeface="Bahnschrift" panose="020B0502040204020203" pitchFamily="34" charset="0"/>
+            </a:endParaRPr>
+          </a:p>
+          <a:p>
+            <a:r>
+              <a:rPr lang="en-US" sz="2400" dirty="0">
+                <a:latin typeface="Bahnschrift" panose="020B0502040204020203" pitchFamily="34" charset="0"/>
+              </a:rPr>
+              <a:t>The values from last week’s Controller will now be pasted on our new object. </a:t>
+            </a:r>
+            <a:endParaRPr lang="en-US" sz="2000" dirty="0">
+              <a:latin typeface="Bahnschrift" panose="020B0502040204020203" pitchFamily="34" charset="0"/>
+            </a:endParaRPr>
+          </a:p>
+        </p:txBody>
+      </p:sp>
     </p:spTree>
     <p:extLst>
       <p:ext uri="{BB962C8B-B14F-4D97-AF65-F5344CB8AC3E}">
-        <p14:creationId xmlns:p14="http://schemas.microsoft.com/office/powerpoint/2010/main" val="2345745521"/>
+        <p14:creationId xmlns:p14="http://schemas.microsoft.com/office/powerpoint/2010/main" val="2528221400"/>
       </p:ext>
     </p:extLst>
   </p:cSld>

</xml_diff>